<commit_message>
Note, Brain Data Scripting Flower Generating modified TODO : Data Bug Fix, Brain Unlock data Updating
</commit_message>
<xml_diff>
--- a/Documentation/D.pptx
+++ b/Documentation/D.pptx
@@ -6,12 +6,13 @@
   </p:sldMasterIdLst>
   <p:sldIdLst>
     <p:sldId id="256" r:id="rId2"/>
-    <p:sldId id="257" r:id="rId3"/>
-    <p:sldId id="260" r:id="rId4"/>
-    <p:sldId id="259" r:id="rId5"/>
-    <p:sldId id="261" r:id="rId6"/>
-    <p:sldId id="263" r:id="rId7"/>
-    <p:sldId id="262" r:id="rId8"/>
+    <p:sldId id="265" r:id="rId3"/>
+    <p:sldId id="257" r:id="rId4"/>
+    <p:sldId id="260" r:id="rId5"/>
+    <p:sldId id="266" r:id="rId6"/>
+    <p:sldId id="261" r:id="rId7"/>
+    <p:sldId id="263" r:id="rId8"/>
+    <p:sldId id="262" r:id="rId9"/>
   </p:sldIdLst>
   <p:sldSz cx="9144000" cy="6858000" type="screen4x3"/>
   <p:notesSz cx="6858000" cy="9144000"/>
@@ -249,7 +250,7 @@
           <a:p>
             <a:fld id="{4FAB21EB-B974-477C-9123-77FDF6646BD7}" type="datetimeFigureOut">
               <a:rPr lang="ko-KR" altLang="en-US" smtClean="0"/>
-              <a:t>2017-01-17</a:t>
+              <a:t>2017-01-19</a:t>
             </a:fld>
             <a:endParaRPr lang="ko-KR" altLang="en-US"/>
           </a:p>
@@ -506,7 +507,7 @@
           <a:p>
             <a:fld id="{4FAB21EB-B974-477C-9123-77FDF6646BD7}" type="datetimeFigureOut">
               <a:rPr lang="ko-KR" altLang="en-US" smtClean="0"/>
-              <a:t>2017-01-17</a:t>
+              <a:t>2017-01-19</a:t>
             </a:fld>
             <a:endParaRPr lang="ko-KR" altLang="en-US"/>
           </a:p>
@@ -676,7 +677,7 @@
           <a:p>
             <a:fld id="{4FAB21EB-B974-477C-9123-77FDF6646BD7}" type="datetimeFigureOut">
               <a:rPr lang="ko-KR" altLang="en-US" smtClean="0"/>
-              <a:t>2017-01-17</a:t>
+              <a:t>2017-01-19</a:t>
             </a:fld>
             <a:endParaRPr lang="ko-KR" altLang="en-US"/>
           </a:p>
@@ -856,7 +857,7 @@
           <a:p>
             <a:fld id="{4FAB21EB-B974-477C-9123-77FDF6646BD7}" type="datetimeFigureOut">
               <a:rPr lang="ko-KR" altLang="en-US" smtClean="0"/>
-              <a:t>2017-01-17</a:t>
+              <a:t>2017-01-19</a:t>
             </a:fld>
             <a:endParaRPr lang="ko-KR" altLang="en-US"/>
           </a:p>
@@ -1106,7 +1107,7 @@
           <a:p>
             <a:fld id="{4FAB21EB-B974-477C-9123-77FDF6646BD7}" type="datetimeFigureOut">
               <a:rPr lang="ko-KR" altLang="en-US" smtClean="0"/>
-              <a:t>2017-01-17</a:t>
+              <a:t>2017-01-19</a:t>
             </a:fld>
             <a:endParaRPr lang="ko-KR" altLang="en-US"/>
           </a:p>
@@ -1367,7 +1368,7 @@
           <a:p>
             <a:fld id="{4FAB21EB-B974-477C-9123-77FDF6646BD7}" type="datetimeFigureOut">
               <a:rPr lang="ko-KR" altLang="en-US" smtClean="0"/>
-              <a:t>2017-01-17</a:t>
+              <a:t>2017-01-19</a:t>
             </a:fld>
             <a:endParaRPr lang="ko-KR" altLang="en-US"/>
           </a:p>
@@ -1618,7 +1619,7 @@
           <a:p>
             <a:fld id="{4FAB21EB-B974-477C-9123-77FDF6646BD7}" type="datetimeFigureOut">
               <a:rPr lang="ko-KR" altLang="en-US" smtClean="0"/>
-              <a:t>2017-01-17</a:t>
+              <a:t>2017-01-19</a:t>
             </a:fld>
             <a:endParaRPr lang="ko-KR" altLang="en-US"/>
           </a:p>
@@ -1857,7 +1858,7 @@
           <a:p>
             <a:fld id="{4FAB21EB-B974-477C-9123-77FDF6646BD7}" type="datetimeFigureOut">
               <a:rPr lang="ko-KR" altLang="en-US" smtClean="0"/>
-              <a:t>2017-01-17</a:t>
+              <a:t>2017-01-19</a:t>
             </a:fld>
             <a:endParaRPr lang="ko-KR" altLang="en-US"/>
           </a:p>
@@ -2224,7 +2225,7 @@
           <a:p>
             <a:fld id="{4FAB21EB-B974-477C-9123-77FDF6646BD7}" type="datetimeFigureOut">
               <a:rPr lang="ko-KR" altLang="en-US" smtClean="0"/>
-              <a:t>2017-01-17</a:t>
+              <a:t>2017-01-19</a:t>
             </a:fld>
             <a:endParaRPr lang="ko-KR" altLang="en-US"/>
           </a:p>
@@ -2342,7 +2343,7 @@
           <a:p>
             <a:fld id="{4FAB21EB-B974-477C-9123-77FDF6646BD7}" type="datetimeFigureOut">
               <a:rPr lang="ko-KR" altLang="en-US" smtClean="0"/>
-              <a:t>2017-01-17</a:t>
+              <a:t>2017-01-19</a:t>
             </a:fld>
             <a:endParaRPr lang="ko-KR" altLang="en-US"/>
           </a:p>
@@ -2437,7 +2438,7 @@
           <a:p>
             <a:fld id="{4FAB21EB-B974-477C-9123-77FDF6646BD7}" type="datetimeFigureOut">
               <a:rPr lang="ko-KR" altLang="en-US" smtClean="0"/>
-              <a:t>2017-01-17</a:t>
+              <a:t>2017-01-19</a:t>
             </a:fld>
             <a:endParaRPr lang="ko-KR" altLang="en-US"/>
           </a:p>
@@ -2714,7 +2715,7 @@
           <a:p>
             <a:fld id="{4FAB21EB-B974-477C-9123-77FDF6646BD7}" type="datetimeFigureOut">
               <a:rPr lang="ko-KR" altLang="en-US" smtClean="0"/>
-              <a:t>2017-01-17</a:t>
+              <a:t>2017-01-19</a:t>
             </a:fld>
             <a:endParaRPr lang="ko-KR" altLang="en-US"/>
           </a:p>
@@ -2927,7 +2928,7 @@
           <a:p>
             <a:fld id="{4FAB21EB-B974-477C-9123-77FDF6646BD7}" type="datetimeFigureOut">
               <a:rPr lang="ko-KR" altLang="en-US" smtClean="0"/>
-              <a:t>2017-01-17</a:t>
+              <a:t>2017-01-19</a:t>
             </a:fld>
             <a:endParaRPr lang="ko-KR" altLang="en-US"/>
           </a:p>
@@ -3382,7 +3383,7 @@
         </p:nvSpPr>
         <p:spPr>
           <a:xfrm>
-            <a:off x="685800" y="1925525"/>
+            <a:off x="685800" y="2662573"/>
             <a:ext cx="7772400" cy="2387600"/>
           </a:xfrm>
         </p:spPr>
@@ -3393,20 +3394,22 @@
           <a:lstStyle/>
           <a:p>
             <a:r>
-              <a:rPr lang="en-US" altLang="ko-KR" sz="9600" dirty="0" smtClean="0">
+              <a:rPr lang="en-US" altLang="ko-KR" sz="13800" dirty="0" smtClean="0">
                 <a:solidFill>
                   <a:schemeClr val="bg1"/>
                 </a:solidFill>
-                <a:latin typeface="Amatic SC" pitchFamily="2" charset="0"/>
+                <a:latin typeface="Sakkal Majalla" panose="02000000000000000000" pitchFamily="2" charset="-78"/>
                 <a:ea typeface="Adobe Kaiti Std R" panose="02020400000000000000" pitchFamily="18" charset="-128"/>
+                <a:cs typeface="Sakkal Majalla" panose="02000000000000000000" pitchFamily="2" charset="-78"/>
               </a:rPr>
               <a:t>D</a:t>
             </a:r>
-            <a:endParaRPr lang="ko-KR" altLang="en-US" sz="9600" dirty="0">
+            <a:endParaRPr lang="ko-KR" altLang="en-US" sz="13800" dirty="0">
               <a:solidFill>
                 <a:schemeClr val="bg1"/>
               </a:solidFill>
-              <a:latin typeface="Amatic SC" pitchFamily="2" charset="0"/>
+              <a:latin typeface="Sakkal Majalla" panose="02000000000000000000" pitchFamily="2" charset="-78"/>
+              <a:cs typeface="Sakkal Majalla" panose="02000000000000000000" pitchFamily="2" charset="-78"/>
             </a:endParaRPr>
           </a:p>
         </p:txBody>
@@ -3423,8 +3426,8 @@
         </p:nvSpPr>
         <p:spPr>
           <a:xfrm>
-            <a:off x="1143000" y="4835753"/>
-            <a:ext cx="6858000" cy="505506"/>
+            <a:off x="1143000" y="4743604"/>
+            <a:ext cx="6858000" cy="1552347"/>
           </a:xfrm>
         </p:spPr>
         <p:txBody>
@@ -3433,20 +3436,70 @@
           </a:bodyPr>
           <a:lstStyle/>
           <a:p>
+            <a:pPr>
+              <a:lnSpc>
+                <a:spcPct val="100000"/>
+              </a:lnSpc>
+              <a:spcBef>
+                <a:spcPts val="0"/>
+              </a:spcBef>
+            </a:pPr>
             <a:r>
               <a:rPr lang="en-US" altLang="ko-KR" sz="3600" dirty="0" smtClean="0">
                 <a:solidFill>
                   <a:schemeClr val="bg1"/>
                 </a:solidFill>
-                <a:latin typeface="Amatic SC" pitchFamily="2" charset="0"/>
+                <a:latin typeface="Sakkal Majalla" panose="02000000000000000000" pitchFamily="2" charset="-78"/>
+                <a:cs typeface="Sakkal Majalla" panose="02000000000000000000" pitchFamily="2" charset="-78"/>
               </a:rPr>
-              <a:t>Line Plus X CATDOG</a:t>
-            </a:r>
-            <a:endParaRPr lang="ko-KR" altLang="en-US" sz="3600" dirty="0">
+              <a:t>Line Plus X </a:t>
+            </a:r>
+            <a:r>
+              <a:rPr lang="en-US" altLang="ko-KR" sz="3600" dirty="0" smtClean="0">
+                <a:solidFill>
+                  <a:schemeClr val="bg1"/>
+                </a:solidFill>
+                <a:latin typeface="Sakkal Majalla" panose="02000000000000000000" pitchFamily="2" charset="-78"/>
+                <a:cs typeface="Sakkal Majalla" panose="02000000000000000000" pitchFamily="2" charset="-78"/>
+              </a:rPr>
+              <a:t>CATDOG</a:t>
+            </a:r>
+          </a:p>
+          <a:p>
+            <a:pPr>
+              <a:lnSpc>
+                <a:spcPct val="100000"/>
+              </a:lnSpc>
+              <a:spcBef>
+                <a:spcPts val="0"/>
+              </a:spcBef>
+            </a:pPr>
+            <a:r>
+              <a:rPr lang="en-US" altLang="ko-KR" sz="2000" dirty="0" smtClean="0">
+                <a:solidFill>
+                  <a:schemeClr val="bg1"/>
+                </a:solidFill>
+                <a:latin typeface="Sakkal Majalla" panose="02000000000000000000" pitchFamily="2" charset="-78"/>
+                <a:cs typeface="Sakkal Majalla" panose="02000000000000000000" pitchFamily="2" charset="-78"/>
+              </a:rPr>
+              <a:t>2</a:t>
+            </a:r>
+            <a:r>
+              <a:rPr lang="en-US" altLang="ko-KR" sz="2000" dirty="0" smtClean="0">
+                <a:solidFill>
+                  <a:schemeClr val="bg1"/>
+                </a:solidFill>
+                <a:latin typeface="Sakkal Majalla" panose="02000000000000000000" pitchFamily="2" charset="-78"/>
+                <a:cs typeface="Sakkal Majalla" panose="02000000000000000000" pitchFamily="2" charset="-78"/>
+              </a:rPr>
+              <a:t>D Mobile Adventure Game</a:t>
+            </a:r>
+            <a:endParaRPr lang="en-US" altLang="ko-KR" sz="2000" dirty="0" smtClean="0">
               <a:solidFill>
                 <a:schemeClr val="bg1"/>
               </a:solidFill>
-              <a:latin typeface="Amatic SC" pitchFamily="2" charset="0"/>
+              <a:latin typeface="Sakkal Majalla" panose="02000000000000000000" pitchFamily="2" charset="-78"/>
+              <a:cs typeface="Sakkal Majalla" panose="02000000000000000000" pitchFamily="2" charset="-78"/>
             </a:endParaRPr>
           </a:p>
         </p:txBody>
@@ -3474,6 +3527,14 @@
 <file path=ppt/slides/slide2.xml><?xml version="1.0" encoding="utf-8"?>
 <p:sld xmlns:a="http://schemas.openxmlformats.org/drawingml/2006/main" xmlns:r="http://schemas.openxmlformats.org/officeDocument/2006/relationships" xmlns:p="http://schemas.openxmlformats.org/presentationml/2006/main">
   <p:cSld>
+    <p:bg>
+      <p:bgPr>
+        <a:solidFill>
+          <a:schemeClr val="tx1"/>
+        </a:solidFill>
+        <a:effectLst/>
+      </p:bgPr>
+    </p:bg>
     <p:spTree>
       <p:nvGrpSpPr>
         <p:cNvPr id="1" name=""/>
@@ -3488,6 +3549,35 @@
           <a:chExt cx="0" cy="0"/>
         </a:xfrm>
       </p:grpSpPr>
+      <p:pic>
+        <p:nvPicPr>
+          <p:cNvPr id="6" name="그림 5"/>
+          <p:cNvPicPr>
+            <a:picLocks noChangeAspect="1"/>
+          </p:cNvPicPr>
+          <p:nvPr/>
+        </p:nvPicPr>
+        <p:blipFill rotWithShape="1">
+          <a:blip r:embed="rId2">
+            <a:extLst>
+              <a:ext uri="{28A0092B-C50C-407E-A947-70E740481C1C}">
+                <a14:useLocalDpi xmlns:a14="http://schemas.microsoft.com/office/drawing/2010/main" val="0"/>
+              </a:ext>
+            </a:extLst>
+          </a:blip>
+          <a:srcRect t="17920" r="26640"/>
+          <a:stretch/>
+        </p:blipFill>
+        <p:spPr>
+          <a:xfrm>
+            <a:off x="2424612" y="-14514"/>
+            <a:ext cx="3555274" cy="5629048"/>
+          </a:xfrm>
+          <a:prstGeom prst="rect">
+            <a:avLst/>
+          </a:prstGeom>
+        </p:spPr>
+      </p:pic>
       <p:sp>
         <p:nvSpPr>
           <p:cNvPr id="2" name="제목 1"/>
@@ -3495,70 +3585,261 @@
             <a:spLocks noGrp="1"/>
           </p:cNvSpPr>
           <p:nvPr>
-            <p:ph type="title"/>
-          </p:nvPr>
-        </p:nvSpPr>
-        <p:spPr/>
-        <p:txBody>
-          <a:bodyPr/>
-          <a:lstStyle/>
-          <a:p>
-            <a:pPr algn="ctr"/>
-            <a:r>
-              <a:rPr lang="en-US" altLang="ko-KR" dirty="0" smtClean="0"/>
-              <a:t>System</a:t>
-            </a:r>
-            <a:endParaRPr lang="ko-KR" altLang="en-US" dirty="0"/>
-          </a:p>
-        </p:txBody>
-      </p:sp>
-      <p:sp>
-        <p:nvSpPr>
-          <p:cNvPr id="3" name="내용 개체 틀 2"/>
-          <p:cNvSpPr>
-            <a:spLocks noGrp="1"/>
-          </p:cNvSpPr>
-          <p:nvPr>
-            <p:ph idx="1"/>
-          </p:nvPr>
-        </p:nvSpPr>
-        <p:spPr/>
-        <p:txBody>
-          <a:bodyPr/>
-          <a:lstStyle/>
-          <a:p>
-            <a:pPr marL="514350" indent="-514350" algn="ctr">
-              <a:buAutoNum type="arabicParenR"/>
-            </a:pPr>
-            <a:r>
-              <a:rPr lang="en-US" altLang="ko-KR" dirty="0" smtClean="0"/>
-              <a:t>Play Style</a:t>
-            </a:r>
-          </a:p>
-          <a:p>
-            <a:pPr marL="514350" indent="-514350" algn="ctr">
-              <a:buAutoNum type="arabicParenR"/>
-            </a:pPr>
-            <a:r>
-              <a:rPr lang="en-US" altLang="ko-KR" dirty="0" smtClean="0"/>
-              <a:t>Map</a:t>
-            </a:r>
-          </a:p>
-          <a:p>
-            <a:pPr marL="514350" indent="-514350" algn="ctr">
-              <a:buAutoNum type="arabicParenR"/>
-            </a:pPr>
-            <a:r>
-              <a:rPr lang="en-US" altLang="ko-KR" dirty="0" smtClean="0"/>
-              <a:t>Unlock</a:t>
-            </a:r>
+            <p:ph type="ctrTitle"/>
+          </p:nvPr>
+        </p:nvSpPr>
+        <p:spPr>
+          <a:xfrm>
+            <a:off x="685800" y="2338933"/>
+            <a:ext cx="7772400" cy="2387600"/>
+          </a:xfrm>
+        </p:spPr>
+        <p:txBody>
+          <a:bodyPr>
+            <a:normAutofit/>
+          </a:bodyPr>
+          <a:lstStyle/>
+          <a:p>
+            <a:r>
+              <a:rPr lang="en-US" altLang="ko-KR" sz="11500" dirty="0" smtClean="0">
+                <a:solidFill>
+                  <a:schemeClr val="bg1"/>
+                </a:solidFill>
+                <a:latin typeface="SketchFlow Print" panose="02000000000000000000" pitchFamily="2" charset="0"/>
+              </a:rPr>
+              <a:t>D</a:t>
+            </a:r>
+            <a:endParaRPr lang="ko-KR" altLang="en-US" sz="11500" dirty="0">
+              <a:solidFill>
+                <a:schemeClr val="bg1"/>
+              </a:solidFill>
+              <a:latin typeface="SketchFlow Print" panose="02000000000000000000" pitchFamily="2" charset="0"/>
+            </a:endParaRPr>
+          </a:p>
+        </p:txBody>
+      </p:sp>
+      <p:sp>
+        <p:nvSpPr>
+          <p:cNvPr id="7" name="부제목 2"/>
+          <p:cNvSpPr txBox="1">
+            <a:spLocks/>
+          </p:cNvSpPr>
+          <p:nvPr/>
+        </p:nvSpPr>
+        <p:spPr>
+          <a:xfrm>
+            <a:off x="1143000" y="4838360"/>
+            <a:ext cx="6858000" cy="1552347"/>
+          </a:xfrm>
+          <a:prstGeom prst="rect">
+            <a:avLst/>
+          </a:prstGeom>
+        </p:spPr>
+        <p:txBody>
+          <a:bodyPr vert="horz" lIns="91440" tIns="45720" rIns="91440" bIns="45720" rtlCol="0">
+            <a:noAutofit/>
+          </a:bodyPr>
+          <a:lstStyle>
+            <a:lvl1pPr marL="0" indent="0" algn="ctr" defTabSz="914400" rtl="0" eaLnBrk="1" latinLnBrk="1" hangingPunct="1">
+              <a:lnSpc>
+                <a:spcPct val="90000"/>
+              </a:lnSpc>
+              <a:spcBef>
+                <a:spcPts val="1000"/>
+              </a:spcBef>
+              <a:buFont typeface="Arial" panose="020B0604020202020204" pitchFamily="34" charset="0"/>
+              <a:buNone/>
+              <a:defRPr sz="2400" kern="1200">
+                <a:solidFill>
+                  <a:schemeClr val="tx1"/>
+                </a:solidFill>
+                <a:latin typeface="+mn-lt"/>
+                <a:ea typeface="+mn-ea"/>
+                <a:cs typeface="+mn-cs"/>
+              </a:defRPr>
+            </a:lvl1pPr>
+            <a:lvl2pPr marL="457200" indent="0" algn="ctr" defTabSz="914400" rtl="0" eaLnBrk="1" latinLnBrk="1" hangingPunct="1">
+              <a:lnSpc>
+                <a:spcPct val="90000"/>
+              </a:lnSpc>
+              <a:spcBef>
+                <a:spcPts val="500"/>
+              </a:spcBef>
+              <a:buFont typeface="Arial" panose="020B0604020202020204" pitchFamily="34" charset="0"/>
+              <a:buNone/>
+              <a:defRPr sz="2000" kern="1200">
+                <a:solidFill>
+                  <a:schemeClr val="tx1"/>
+                </a:solidFill>
+                <a:latin typeface="+mn-lt"/>
+                <a:ea typeface="+mn-ea"/>
+                <a:cs typeface="+mn-cs"/>
+              </a:defRPr>
+            </a:lvl2pPr>
+            <a:lvl3pPr marL="914400" indent="0" algn="ctr" defTabSz="914400" rtl="0" eaLnBrk="1" latinLnBrk="1" hangingPunct="1">
+              <a:lnSpc>
+                <a:spcPct val="90000"/>
+              </a:lnSpc>
+              <a:spcBef>
+                <a:spcPts val="500"/>
+              </a:spcBef>
+              <a:buFont typeface="Arial" panose="020B0604020202020204" pitchFamily="34" charset="0"/>
+              <a:buNone/>
+              <a:defRPr sz="1800" kern="1200">
+                <a:solidFill>
+                  <a:schemeClr val="tx1"/>
+                </a:solidFill>
+                <a:latin typeface="+mn-lt"/>
+                <a:ea typeface="+mn-ea"/>
+                <a:cs typeface="+mn-cs"/>
+              </a:defRPr>
+            </a:lvl3pPr>
+            <a:lvl4pPr marL="1371600" indent="0" algn="ctr" defTabSz="914400" rtl="0" eaLnBrk="1" latinLnBrk="1" hangingPunct="1">
+              <a:lnSpc>
+                <a:spcPct val="90000"/>
+              </a:lnSpc>
+              <a:spcBef>
+                <a:spcPts val="500"/>
+              </a:spcBef>
+              <a:buFont typeface="Arial" panose="020B0604020202020204" pitchFamily="34" charset="0"/>
+              <a:buNone/>
+              <a:defRPr sz="1600" kern="1200">
+                <a:solidFill>
+                  <a:schemeClr val="tx1"/>
+                </a:solidFill>
+                <a:latin typeface="+mn-lt"/>
+                <a:ea typeface="+mn-ea"/>
+                <a:cs typeface="+mn-cs"/>
+              </a:defRPr>
+            </a:lvl4pPr>
+            <a:lvl5pPr marL="1828800" indent="0" algn="ctr" defTabSz="914400" rtl="0" eaLnBrk="1" latinLnBrk="1" hangingPunct="1">
+              <a:lnSpc>
+                <a:spcPct val="90000"/>
+              </a:lnSpc>
+              <a:spcBef>
+                <a:spcPts val="500"/>
+              </a:spcBef>
+              <a:buFont typeface="Arial" panose="020B0604020202020204" pitchFamily="34" charset="0"/>
+              <a:buNone/>
+              <a:defRPr sz="1600" kern="1200">
+                <a:solidFill>
+                  <a:schemeClr val="tx1"/>
+                </a:solidFill>
+                <a:latin typeface="+mn-lt"/>
+                <a:ea typeface="+mn-ea"/>
+                <a:cs typeface="+mn-cs"/>
+              </a:defRPr>
+            </a:lvl5pPr>
+            <a:lvl6pPr marL="2286000" indent="0" algn="ctr" defTabSz="914400" rtl="0" eaLnBrk="1" latinLnBrk="1" hangingPunct="1">
+              <a:lnSpc>
+                <a:spcPct val="90000"/>
+              </a:lnSpc>
+              <a:spcBef>
+                <a:spcPts val="500"/>
+              </a:spcBef>
+              <a:buFont typeface="Arial" panose="020B0604020202020204" pitchFamily="34" charset="0"/>
+              <a:buNone/>
+              <a:defRPr sz="1600" kern="1200">
+                <a:solidFill>
+                  <a:schemeClr val="tx1"/>
+                </a:solidFill>
+                <a:latin typeface="+mn-lt"/>
+                <a:ea typeface="+mn-ea"/>
+                <a:cs typeface="+mn-cs"/>
+              </a:defRPr>
+            </a:lvl6pPr>
+            <a:lvl7pPr marL="2743200" indent="0" algn="ctr" defTabSz="914400" rtl="0" eaLnBrk="1" latinLnBrk="1" hangingPunct="1">
+              <a:lnSpc>
+                <a:spcPct val="90000"/>
+              </a:lnSpc>
+              <a:spcBef>
+                <a:spcPts val="500"/>
+              </a:spcBef>
+              <a:buFont typeface="Arial" panose="020B0604020202020204" pitchFamily="34" charset="0"/>
+              <a:buNone/>
+              <a:defRPr sz="1600" kern="1200">
+                <a:solidFill>
+                  <a:schemeClr val="tx1"/>
+                </a:solidFill>
+                <a:latin typeface="+mn-lt"/>
+                <a:ea typeface="+mn-ea"/>
+                <a:cs typeface="+mn-cs"/>
+              </a:defRPr>
+            </a:lvl7pPr>
+            <a:lvl8pPr marL="3200400" indent="0" algn="ctr" defTabSz="914400" rtl="0" eaLnBrk="1" latinLnBrk="1" hangingPunct="1">
+              <a:lnSpc>
+                <a:spcPct val="90000"/>
+              </a:lnSpc>
+              <a:spcBef>
+                <a:spcPts val="500"/>
+              </a:spcBef>
+              <a:buFont typeface="Arial" panose="020B0604020202020204" pitchFamily="34" charset="0"/>
+              <a:buNone/>
+              <a:defRPr sz="1600" kern="1200">
+                <a:solidFill>
+                  <a:schemeClr val="tx1"/>
+                </a:solidFill>
+                <a:latin typeface="+mn-lt"/>
+                <a:ea typeface="+mn-ea"/>
+                <a:cs typeface="+mn-cs"/>
+              </a:defRPr>
+            </a:lvl8pPr>
+            <a:lvl9pPr marL="3657600" indent="0" algn="ctr" defTabSz="914400" rtl="0" eaLnBrk="1" latinLnBrk="1" hangingPunct="1">
+              <a:lnSpc>
+                <a:spcPct val="90000"/>
+              </a:lnSpc>
+              <a:spcBef>
+                <a:spcPts val="500"/>
+              </a:spcBef>
+              <a:buFont typeface="Arial" panose="020B0604020202020204" pitchFamily="34" charset="0"/>
+              <a:buNone/>
+              <a:defRPr sz="1600" kern="1200">
+                <a:solidFill>
+                  <a:schemeClr val="tx1"/>
+                </a:solidFill>
+                <a:latin typeface="+mn-lt"/>
+                <a:ea typeface="+mn-ea"/>
+                <a:cs typeface="+mn-cs"/>
+              </a:defRPr>
+            </a:lvl9pPr>
+          </a:lstStyle>
+          <a:p>
+            <a:r>
+              <a:rPr lang="en-US" altLang="ko-KR" sz="3200" dirty="0" smtClean="0">
+                <a:solidFill>
+                  <a:schemeClr val="bg1"/>
+                </a:solidFill>
+                <a:latin typeface="SketchFlow Print" panose="02000000000000000000" pitchFamily="2" charset="0"/>
+                <a:cs typeface="Sakkal Majalla" panose="02000000000000000000" pitchFamily="2" charset="-78"/>
+              </a:rPr>
+              <a:t>Line Plus X CATDOG</a:t>
+            </a:r>
+          </a:p>
+          <a:p>
+            <a:r>
+              <a:rPr lang="en-US" altLang="ko-KR" sz="1800" dirty="0" smtClean="0">
+                <a:solidFill>
+                  <a:schemeClr val="bg1"/>
+                </a:solidFill>
+                <a:latin typeface="SketchFlow Print" panose="02000000000000000000" pitchFamily="2" charset="0"/>
+                <a:cs typeface="Sakkal Majalla" panose="02000000000000000000" pitchFamily="2" charset="-78"/>
+              </a:rPr>
+              <a:t>2D Mobile Adventure Game</a:t>
+            </a:r>
+            <a:endParaRPr lang="en-US" altLang="ko-KR" sz="1800" dirty="0" smtClean="0">
+              <a:solidFill>
+                <a:schemeClr val="bg1"/>
+              </a:solidFill>
+              <a:latin typeface="SketchFlow Print" panose="02000000000000000000" pitchFamily="2" charset="0"/>
+              <a:cs typeface="Sakkal Majalla" panose="02000000000000000000" pitchFamily="2" charset="-78"/>
+            </a:endParaRPr>
           </a:p>
         </p:txBody>
       </p:sp>
     </p:spTree>
     <p:extLst>
       <p:ext uri="{BB962C8B-B14F-4D97-AF65-F5344CB8AC3E}">
-        <p14:creationId xmlns:p14="http://schemas.microsoft.com/office/powerpoint/2010/main" val="3300658109"/>
+        <p14:creationId xmlns:p14="http://schemas.microsoft.com/office/powerpoint/2010/main" val="381047478"/>
       </p:ext>
     </p:extLst>
   </p:cSld>
@@ -3604,119 +3885,65 @@
         </p:nvSpPr>
         <p:spPr/>
         <p:txBody>
-          <a:bodyPr>
-            <a:normAutofit/>
-          </a:bodyPr>
+          <a:bodyPr/>
           <a:lstStyle/>
           <a:p>
             <a:pPr algn="ctr"/>
             <a:r>
-              <a:rPr lang="en-US" altLang="ko-KR" sz="2400" dirty="0" smtClean="0">
-                <a:solidFill>
-                  <a:schemeClr val="bg1">
-                    <a:lumMod val="85000"/>
-                  </a:schemeClr>
-                </a:solidFill>
-              </a:rPr>
+              <a:rPr lang="en-US" altLang="ko-KR" dirty="0" smtClean="0"/>
               <a:t>System</a:t>
             </a:r>
+            <a:endParaRPr lang="ko-KR" altLang="en-US" dirty="0"/>
+          </a:p>
+        </p:txBody>
+      </p:sp>
+      <p:sp>
+        <p:nvSpPr>
+          <p:cNvPr id="3" name="내용 개체 틀 2"/>
+          <p:cNvSpPr>
+            <a:spLocks noGrp="1"/>
+          </p:cNvSpPr>
+          <p:nvPr>
+            <p:ph idx="1"/>
+          </p:nvPr>
+        </p:nvSpPr>
+        <p:spPr/>
+        <p:txBody>
+          <a:bodyPr/>
+          <a:lstStyle/>
+          <a:p>
+            <a:pPr marL="514350" indent="-514350" algn="ctr">
+              <a:buAutoNum type="arabicParenR"/>
+            </a:pPr>
             <a:r>
               <a:rPr lang="en-US" altLang="ko-KR" dirty="0" smtClean="0"/>
-              <a:t/>
-            </a:r>
-            <a:br>
+              <a:t>Play Style</a:t>
+            </a:r>
+          </a:p>
+          <a:p>
+            <a:pPr marL="514350" indent="-514350" algn="ctr">
+              <a:buAutoNum type="arabicParenR"/>
+            </a:pPr>
+            <a:r>
               <a:rPr lang="en-US" altLang="ko-KR" dirty="0" smtClean="0"/>
-            </a:br>
+              <a:t>Map</a:t>
+            </a:r>
+          </a:p>
+          <a:p>
+            <a:pPr marL="514350" indent="-514350" algn="ctr">
+              <a:buAutoNum type="arabicParenR"/>
+            </a:pPr>
             <a:r>
               <a:rPr lang="en-US" altLang="ko-KR" dirty="0" smtClean="0"/>
-              <a:t>1) Play Style</a:t>
-            </a:r>
-            <a:endParaRPr lang="ko-KR" altLang="en-US" dirty="0"/>
-          </a:p>
-        </p:txBody>
-      </p:sp>
-      <p:sp>
-        <p:nvSpPr>
-          <p:cNvPr id="3" name="내용 개체 틀 2"/>
-          <p:cNvSpPr>
-            <a:spLocks noGrp="1"/>
-          </p:cNvSpPr>
-          <p:nvPr>
-            <p:ph idx="1"/>
-          </p:nvPr>
-        </p:nvSpPr>
-        <p:spPr/>
-        <p:txBody>
-          <a:bodyPr/>
-          <a:lstStyle/>
-          <a:p>
-            <a:pPr marL="0" indent="0" algn="ctr">
-              <a:buNone/>
-            </a:pPr>
-            <a:r>
-              <a:rPr lang="en-US" altLang="ko-KR" dirty="0" smtClean="0"/>
-              <a:t>Game – Menu – Game – Menu … </a:t>
-            </a:r>
-            <a:r>
-              <a:rPr lang="ko-KR" altLang="en-US" dirty="0" smtClean="0"/>
-              <a:t>의</a:t>
-            </a:r>
-            <a:r>
-              <a:rPr lang="en-US" altLang="ko-KR" dirty="0" smtClean="0"/>
-              <a:t> Flow</a:t>
-            </a:r>
-          </a:p>
-          <a:p>
-            <a:pPr marL="0" indent="0" algn="ctr">
-              <a:buNone/>
-            </a:pPr>
-            <a:r>
-              <a:rPr lang="ko-KR" altLang="en-US" dirty="0" smtClean="0"/>
-              <a:t>단순 반복 </a:t>
-            </a:r>
-            <a:r>
-              <a:rPr lang="en-US" altLang="ko-KR" dirty="0" smtClean="0"/>
-              <a:t>Play</a:t>
-            </a:r>
-          </a:p>
-          <a:p>
-            <a:pPr marL="0" indent="0" algn="ctr">
-              <a:buNone/>
-            </a:pPr>
-            <a:r>
-              <a:rPr lang="en-US" altLang="ko-KR" dirty="0" smtClean="0"/>
-              <a:t>Game </a:t>
-            </a:r>
-            <a:r>
-              <a:rPr lang="ko-KR" altLang="en-US" dirty="0" smtClean="0"/>
-              <a:t>목표 </a:t>
-            </a:r>
-            <a:r>
-              <a:rPr lang="en-US" altLang="ko-KR" dirty="0"/>
-              <a:t>: </a:t>
-            </a:r>
-            <a:r>
-              <a:rPr lang="ko-KR" altLang="en-US" dirty="0"/>
-              <a:t>화폐 </a:t>
-            </a:r>
-            <a:r>
-              <a:rPr lang="ko-KR" altLang="en-US" dirty="0" smtClean="0"/>
-              <a:t>수집 및 해금</a:t>
-            </a:r>
-            <a:endParaRPr lang="en-US" altLang="ko-KR" dirty="0"/>
-          </a:p>
-          <a:p>
-            <a:pPr marL="0" indent="0" algn="ctr">
-              <a:buNone/>
-            </a:pPr>
-            <a:endParaRPr lang="ko-KR" altLang="en-US" dirty="0"/>
+              <a:t>Unlock</a:t>
+            </a:r>
           </a:p>
         </p:txBody>
       </p:sp>
     </p:spTree>
     <p:extLst>
       <p:ext uri="{BB962C8B-B14F-4D97-AF65-F5344CB8AC3E}">
-        <p14:creationId xmlns:p14="http://schemas.microsoft.com/office/powerpoint/2010/main" val="1529986191"/>
+        <p14:creationId xmlns:p14="http://schemas.microsoft.com/office/powerpoint/2010/main" val="3300658109"/>
       </p:ext>
     </p:extLst>
   </p:cSld>
@@ -3767,8 +3994,9 @@
           </a:bodyPr>
           <a:lstStyle/>
           <a:p>
-            <a:r>
-              <a:rPr lang="en-US" altLang="ko-KR" sz="2400" dirty="0">
+            <a:pPr algn="ctr"/>
+            <a:r>
+              <a:rPr lang="en-US" altLang="ko-KR" sz="2400" dirty="0" smtClean="0">
                 <a:solidFill>
                   <a:schemeClr val="bg1">
                     <a:lumMod val="85000"/>
@@ -3786,7 +4014,7 @@
             </a:br>
             <a:r>
               <a:rPr lang="en-US" altLang="ko-KR" dirty="0" smtClean="0"/>
-              <a:t>2) Map</a:t>
+              <a:t>1) Play Style</a:t>
             </a:r>
             <a:endParaRPr lang="ko-KR" altLang="en-US" dirty="0"/>
           </a:p>
@@ -3804,9 +4032,7 @@
         </p:nvSpPr>
         <p:spPr/>
         <p:txBody>
-          <a:bodyPr>
-            <a:normAutofit/>
-          </a:bodyPr>
+          <a:bodyPr/>
           <a:lstStyle/>
           <a:p>
             <a:pPr marL="0" indent="0" algn="ctr">
@@ -3814,11 +4040,15 @@
             </a:pPr>
             <a:r>
               <a:rPr lang="ko-KR" altLang="en-US" dirty="0" smtClean="0"/>
-              <a:t>원형 미로 모양 </a:t>
+              <a:t>단순 </a:t>
+            </a:r>
+            <a:r>
+              <a:rPr lang="ko-KR" altLang="en-US" dirty="0" smtClean="0"/>
+              <a:t>반복 </a:t>
             </a:r>
             <a:r>
               <a:rPr lang="en-US" altLang="ko-KR" dirty="0" smtClean="0"/>
-              <a:t>Map</a:t>
+              <a:t>Play</a:t>
             </a:r>
           </a:p>
           <a:p>
@@ -3826,12 +4056,8 @@
               <a:buNone/>
             </a:pPr>
             <a:r>
-              <a:rPr lang="ko-KR" altLang="en-US" dirty="0" smtClean="0"/>
-              <a:t>시작 지점에 </a:t>
-            </a:r>
-            <a:r>
               <a:rPr lang="en-US" altLang="ko-KR" dirty="0" smtClean="0"/>
-              <a:t>Mini</a:t>
+              <a:t>Goal</a:t>
             </a:r>
             <a:r>
               <a:rPr lang="ko-KR" altLang="en-US" dirty="0" smtClean="0"/>
@@ -3839,76 +4065,30 @@
             </a:r>
             <a:r>
               <a:rPr lang="en-US" altLang="ko-KR" dirty="0"/>
-              <a:t>Map</a:t>
-            </a:r>
-            <a:r>
-              <a:rPr lang="en-US" altLang="ko-KR" dirty="0" smtClean="0"/>
-              <a:t> </a:t>
+              <a:t>: </a:t>
+            </a:r>
+            <a:r>
+              <a:rPr lang="ko-KR" altLang="en-US" dirty="0"/>
+              <a:t>화폐 </a:t>
             </a:r>
             <a:r>
               <a:rPr lang="ko-KR" altLang="en-US" dirty="0" smtClean="0"/>
-              <a:t>표시</a:t>
-            </a:r>
-            <a:endParaRPr lang="en-US" altLang="ko-KR" dirty="0" smtClean="0"/>
+              <a:t>수집 및 해금</a:t>
+            </a:r>
+            <a:endParaRPr lang="en-US" altLang="ko-KR" dirty="0"/>
           </a:p>
           <a:p>
             <a:pPr marL="0" indent="0" algn="ctr">
               <a:buNone/>
             </a:pPr>
-            <a:r>
-              <a:rPr lang="en-US" altLang="ko-KR" dirty="0" smtClean="0"/>
-              <a:t>Trigger</a:t>
-            </a:r>
-            <a:r>
-              <a:rPr lang="ko-KR" altLang="en-US" dirty="0" smtClean="0"/>
-              <a:t> 작동 시 전체 </a:t>
-            </a:r>
-            <a:r>
-              <a:rPr lang="en-US" altLang="ko-KR" dirty="0" smtClean="0"/>
-              <a:t>Map</a:t>
-            </a:r>
-            <a:r>
-              <a:rPr lang="ko-KR" altLang="en-US" dirty="0" smtClean="0"/>
-              <a:t>이 넓어짐</a:t>
-            </a:r>
-            <a:endParaRPr lang="en-US" altLang="ko-KR" dirty="0" smtClean="0"/>
-          </a:p>
-          <a:p>
-            <a:pPr marL="0" indent="0" algn="ctr">
-              <a:buNone/>
-            </a:pPr>
-            <a:r>
-              <a:rPr lang="en-US" altLang="ko-KR" dirty="0" smtClean="0"/>
-              <a:t>Game </a:t>
-            </a:r>
-            <a:r>
-              <a:rPr lang="ko-KR" altLang="en-US" dirty="0" smtClean="0"/>
-              <a:t>종료 </a:t>
-            </a:r>
-            <a:r>
-              <a:rPr lang="en-US" altLang="ko-KR" dirty="0" smtClean="0"/>
-              <a:t>: </a:t>
-            </a:r>
-            <a:r>
-              <a:rPr lang="ko-KR" altLang="en-US" dirty="0" smtClean="0"/>
-              <a:t>제한시간</a:t>
-            </a:r>
-            <a:r>
-              <a:rPr lang="en-US" altLang="ko-KR" dirty="0" smtClean="0"/>
-              <a:t>, </a:t>
-            </a:r>
-            <a:r>
-              <a:rPr lang="ko-KR" altLang="en-US" dirty="0" smtClean="0"/>
-              <a:t>적</a:t>
-            </a:r>
-            <a:endParaRPr lang="en-US" altLang="ko-KR" dirty="0" smtClean="0"/>
+            <a:endParaRPr lang="ko-KR" altLang="en-US" dirty="0"/>
           </a:p>
         </p:txBody>
       </p:sp>
     </p:spTree>
     <p:extLst>
       <p:ext uri="{BB962C8B-B14F-4D97-AF65-F5344CB8AC3E}">
-        <p14:creationId xmlns:p14="http://schemas.microsoft.com/office/powerpoint/2010/main" val="148300329"/>
+        <p14:creationId xmlns:p14="http://schemas.microsoft.com/office/powerpoint/2010/main" val="1529986191"/>
       </p:ext>
     </p:extLst>
   </p:cSld>
@@ -3978,59 +4158,60 @@
             </a:br>
             <a:r>
               <a:rPr lang="en-US" altLang="ko-KR" dirty="0" smtClean="0"/>
-              <a:t>3</a:t>
+              <a:t>2) Map</a:t>
+            </a:r>
+            <a:endParaRPr lang="ko-KR" altLang="en-US" dirty="0"/>
+          </a:p>
+        </p:txBody>
+      </p:sp>
+      <p:sp>
+        <p:nvSpPr>
+          <p:cNvPr id="3" name="내용 개체 틀 2"/>
+          <p:cNvSpPr>
+            <a:spLocks noGrp="1"/>
+          </p:cNvSpPr>
+          <p:nvPr>
+            <p:ph idx="1"/>
+          </p:nvPr>
+        </p:nvSpPr>
+        <p:spPr/>
+        <p:txBody>
+          <a:bodyPr>
+            <a:normAutofit/>
+          </a:bodyPr>
+          <a:lstStyle/>
+          <a:p>
+            <a:pPr marL="0" indent="0" algn="ctr">
+              <a:buNone/>
+            </a:pPr>
+            <a:r>
+              <a:rPr lang="ko-KR" altLang="en-US" dirty="0" smtClean="0"/>
+              <a:t>원형 미로 모양 </a:t>
             </a:r>
             <a:r>
               <a:rPr lang="en-US" altLang="ko-KR" dirty="0" smtClean="0"/>
-              <a:t>) Unlock</a:t>
-            </a:r>
-            <a:endParaRPr lang="ko-KR" altLang="en-US" dirty="0"/>
-          </a:p>
-        </p:txBody>
-      </p:sp>
-      <p:sp>
-        <p:nvSpPr>
-          <p:cNvPr id="3" name="내용 개체 틀 2"/>
-          <p:cNvSpPr>
-            <a:spLocks noGrp="1"/>
-          </p:cNvSpPr>
-          <p:nvPr>
-            <p:ph idx="1"/>
-          </p:nvPr>
-        </p:nvSpPr>
-        <p:spPr/>
-        <p:txBody>
-          <a:bodyPr/>
-          <a:lstStyle/>
+              <a:t>Map</a:t>
+            </a:r>
+          </a:p>
           <a:p>
             <a:pPr marL="0" indent="0" algn="ctr">
               <a:buNone/>
             </a:pPr>
             <a:r>
               <a:rPr lang="ko-KR" altLang="en-US" dirty="0" smtClean="0"/>
-              <a:t>화폐를 사용하여 </a:t>
+              <a:t>시작 지점에 </a:t>
             </a:r>
             <a:r>
               <a:rPr lang="en-US" altLang="ko-KR" dirty="0" smtClean="0"/>
-              <a:t>Story Unlock </a:t>
+              <a:t>Mini</a:t>
             </a:r>
             <a:r>
               <a:rPr lang="ko-KR" altLang="en-US" dirty="0" smtClean="0"/>
-              <a:t>가능</a:t>
-            </a:r>
-            <a:endParaRPr lang="en-US" altLang="ko-KR" dirty="0" smtClean="0"/>
-          </a:p>
-          <a:p>
-            <a:pPr marL="0" indent="0" algn="ctr">
-              <a:buNone/>
-            </a:pPr>
-            <a:r>
-              <a:rPr lang="en-US" altLang="ko-KR" dirty="0" smtClean="0"/>
-              <a:t>Game </a:t>
-            </a:r>
-            <a:r>
-              <a:rPr lang="ko-KR" altLang="en-US" dirty="0" smtClean="0"/>
-              <a:t>내</a:t>
+              <a:t> </a:t>
+            </a:r>
+            <a:r>
+              <a:rPr lang="en-US" altLang="ko-KR" dirty="0"/>
+              <a:t>Map</a:t>
             </a:r>
             <a:r>
               <a:rPr lang="en-US" altLang="ko-KR" dirty="0" smtClean="0"/>
@@ -4038,48 +4219,120 @@
             </a:r>
             <a:r>
               <a:rPr lang="ko-KR" altLang="en-US" dirty="0" smtClean="0"/>
-              <a:t>생존 시간 증가</a:t>
+              <a:t>표시</a:t>
             </a:r>
             <a:endParaRPr lang="en-US" altLang="ko-KR" dirty="0" smtClean="0"/>
           </a:p>
           <a:p>
+            <a:pPr marL="0" indent="0">
+              <a:buNone/>
+            </a:pPr>
+            <a:r>
+              <a:rPr lang="en-US" altLang="ko-KR" dirty="0"/>
+              <a:t>Game </a:t>
+            </a:r>
+            <a:r>
+              <a:rPr lang="ko-KR" altLang="en-US" dirty="0"/>
+              <a:t>종료 </a:t>
+            </a:r>
+            <a:r>
+              <a:rPr lang="en-US" altLang="ko-KR" dirty="0"/>
+              <a:t>: </a:t>
+            </a:r>
+            <a:r>
+              <a:rPr lang="ko-KR" altLang="en-US" dirty="0"/>
+              <a:t>제한시간</a:t>
+            </a:r>
+            <a:r>
+              <a:rPr lang="en-US" altLang="ko-KR" dirty="0"/>
+              <a:t>, </a:t>
+            </a:r>
+            <a:r>
+              <a:rPr lang="ko-KR" altLang="en-US" dirty="0" smtClean="0"/>
+              <a:t>적</a:t>
+            </a:r>
+            <a:endParaRPr lang="en-US" altLang="ko-KR" dirty="0" smtClean="0"/>
+          </a:p>
+          <a:p>
             <a:pPr marL="0" indent="0" algn="ctr">
               <a:buNone/>
             </a:pPr>
             <a:r>
               <a:rPr lang="ko-KR" altLang="en-US" dirty="0" smtClean="0"/>
-              <a:t>모든</a:t>
-            </a:r>
-            <a:r>
-              <a:rPr lang="en-US" altLang="ko-KR" dirty="0"/>
-              <a:t> </a:t>
+              <a:t>특정 조건 만족 시 전체 </a:t>
             </a:r>
             <a:r>
               <a:rPr lang="en-US" altLang="ko-KR" dirty="0" smtClean="0"/>
-              <a:t>Story </a:t>
+              <a:t>Map</a:t>
             </a:r>
             <a:r>
               <a:rPr lang="ko-KR" altLang="en-US" dirty="0" smtClean="0"/>
-              <a:t>해금 시 </a:t>
-            </a:r>
-            <a:r>
-              <a:rPr lang="en-US" altLang="ko-KR" dirty="0" smtClean="0"/>
-              <a:t>Game End</a:t>
-            </a:r>
-            <a:endParaRPr lang="en-US" altLang="ko-KR" dirty="0"/>
-          </a:p>
-          <a:p>
-            <a:pPr marL="0" indent="0" algn="ctr">
-              <a:buNone/>
-            </a:pPr>
+              <a:t>이 </a:t>
+            </a:r>
+            <a:r>
+              <a:rPr lang="ko-KR" altLang="en-US" dirty="0" smtClean="0"/>
+              <a:t>넓어짐</a:t>
+            </a:r>
             <a:endParaRPr lang="en-US" altLang="ko-KR" dirty="0" smtClean="0"/>
           </a:p>
         </p:txBody>
       </p:sp>
+      <p:pic>
+        <p:nvPicPr>
+          <p:cNvPr id="4" name="Picture 2" descr="design1 copy"/>
+          <p:cNvPicPr>
+            <a:picLocks noChangeAspect="1" noChangeArrowheads="1"/>
+          </p:cNvPicPr>
+          <p:nvPr/>
+        </p:nvPicPr>
+        <p:blipFill rotWithShape="1">
+          <a:blip r:embed="rId2" cstate="print">
+            <a:extLst>
+              <a:ext uri="{28A0092B-C50C-407E-A947-70E740481C1C}">
+                <a14:useLocalDpi xmlns:a14="http://schemas.microsoft.com/office/drawing/2010/main" val="0"/>
+              </a:ext>
+            </a:extLst>
+          </a:blip>
+          <a:srcRect l="23267" r="22900"/>
+          <a:stretch/>
+        </p:blipFill>
+        <p:spPr bwMode="auto">
+          <a:xfrm>
+            <a:off x="6351" y="0"/>
+            <a:ext cx="3746500" cy="6858000"/>
+          </a:xfrm>
+          <a:prstGeom prst="rect">
+            <a:avLst/>
+          </a:prstGeom>
+          <a:noFill/>
+          <a:ln>
+            <a:noFill/>
+          </a:ln>
+          <a:extLst>
+            <a:ext uri="{909E8E84-426E-40DD-AFC4-6F175D3DCCD1}">
+              <a14:hiddenFill xmlns:a14="http://schemas.microsoft.com/office/drawing/2010/main">
+                <a:solidFill>
+                  <a:srgbClr val="FFFFFF"/>
+                </a:solidFill>
+              </a14:hiddenFill>
+            </a:ext>
+            <a:ext uri="{91240B29-F687-4F45-9708-019B960494DF}">
+              <a14:hiddenLine xmlns:a14="http://schemas.microsoft.com/office/drawing/2010/main" w="9525">
+                <a:solidFill>
+                  <a:srgbClr val="000000"/>
+                </a:solidFill>
+                <a:miter lim="800000"/>
+                <a:headEnd/>
+                <a:tailEnd/>
+              </a14:hiddenLine>
+            </a:ext>
+          </a:extLst>
+        </p:spPr>
+      </p:pic>
     </p:spTree>
     <p:extLst>
       <p:ext uri="{BB962C8B-B14F-4D97-AF65-F5344CB8AC3E}">
-        <p14:creationId xmlns:p14="http://schemas.microsoft.com/office/powerpoint/2010/main" val="1761270093"/>
+        <p14:creationId xmlns:p14="http://schemas.microsoft.com/office/powerpoint/2010/main" val="3209363763"/>
       </p:ext>
     </p:extLst>
   </p:cSld>
@@ -4113,35 +4366,164 @@
           <a:chExt cx="0" cy="0"/>
         </a:xfrm>
       </p:grpSpPr>
-      <p:pic>
-        <p:nvPicPr>
-          <p:cNvPr id="5" name="그림 4"/>
-          <p:cNvPicPr>
-            <a:picLocks noChangeAspect="1"/>
-          </p:cNvPicPr>
-          <p:nvPr/>
-        </p:nvPicPr>
-        <p:blipFill rotWithShape="1">
-          <a:blip r:embed="rId2">
-            <a:extLst>
-              <a:ext uri="{28A0092B-C50C-407E-A947-70E740481C1C}">
-                <a14:useLocalDpi xmlns:a14="http://schemas.microsoft.com/office/drawing/2010/main" val="0"/>
-              </a:ext>
-            </a:extLst>
-          </a:blip>
-          <a:srcRect l="20519" t="18909" r="26501" b="61389"/>
-          <a:stretch/>
-        </p:blipFill>
-        <p:spPr>
-          <a:xfrm>
-            <a:off x="3192953" y="1295643"/>
-            <a:ext cx="2567594" cy="1351166"/>
-          </a:xfrm>
-          <a:prstGeom prst="rect">
-            <a:avLst/>
-          </a:prstGeom>
-        </p:spPr>
-      </p:pic>
+      <p:sp>
+        <p:nvSpPr>
+          <p:cNvPr id="2" name="제목 1"/>
+          <p:cNvSpPr>
+            <a:spLocks noGrp="1"/>
+          </p:cNvSpPr>
+          <p:nvPr>
+            <p:ph type="title"/>
+          </p:nvPr>
+        </p:nvSpPr>
+        <p:spPr/>
+        <p:txBody>
+          <a:bodyPr>
+            <a:normAutofit/>
+          </a:bodyPr>
+          <a:lstStyle/>
+          <a:p>
+            <a:r>
+              <a:rPr lang="en-US" altLang="ko-KR" sz="2400" dirty="0">
+                <a:solidFill>
+                  <a:schemeClr val="bg1">
+                    <a:lumMod val="85000"/>
+                  </a:schemeClr>
+                </a:solidFill>
+              </a:rPr>
+              <a:t>System</a:t>
+            </a:r>
+            <a:r>
+              <a:rPr lang="en-US" altLang="ko-KR" dirty="0" smtClean="0"/>
+              <a:t/>
+            </a:r>
+            <a:br>
+              <a:rPr lang="en-US" altLang="ko-KR" dirty="0" smtClean="0"/>
+            </a:br>
+            <a:r>
+              <a:rPr lang="en-US" altLang="ko-KR" dirty="0" smtClean="0"/>
+              <a:t>3) Unlock</a:t>
+            </a:r>
+            <a:endParaRPr lang="ko-KR" altLang="en-US" dirty="0"/>
+          </a:p>
+        </p:txBody>
+      </p:sp>
+      <p:sp>
+        <p:nvSpPr>
+          <p:cNvPr id="3" name="내용 개체 틀 2"/>
+          <p:cNvSpPr>
+            <a:spLocks noGrp="1"/>
+          </p:cNvSpPr>
+          <p:nvPr>
+            <p:ph idx="1"/>
+          </p:nvPr>
+        </p:nvSpPr>
+        <p:spPr/>
+        <p:txBody>
+          <a:bodyPr/>
+          <a:lstStyle/>
+          <a:p>
+            <a:pPr marL="0" indent="0" algn="ctr">
+              <a:buNone/>
+            </a:pPr>
+            <a:r>
+              <a:rPr lang="ko-KR" altLang="en-US" dirty="0" smtClean="0"/>
+              <a:t>화폐를 사용하여 </a:t>
+            </a:r>
+            <a:r>
+              <a:rPr lang="en-US" altLang="ko-KR" dirty="0" smtClean="0"/>
+              <a:t>Unlock </a:t>
+            </a:r>
+            <a:r>
+              <a:rPr lang="ko-KR" altLang="en-US" dirty="0" smtClean="0"/>
+              <a:t>가능</a:t>
+            </a:r>
+            <a:endParaRPr lang="en-US" altLang="ko-KR" dirty="0" smtClean="0"/>
+          </a:p>
+          <a:p>
+            <a:pPr marL="0" indent="0" algn="ctr">
+              <a:buNone/>
+            </a:pPr>
+            <a:r>
+              <a:rPr lang="en-US" altLang="ko-KR" dirty="0" smtClean="0"/>
+              <a:t>Story</a:t>
+            </a:r>
+            <a:r>
+              <a:rPr lang="ko-KR" altLang="en-US" dirty="0"/>
+              <a:t> </a:t>
+            </a:r>
+            <a:r>
+              <a:rPr lang="en-US" altLang="ko-KR" dirty="0" smtClean="0"/>
+              <a:t>Unlock / Field Unlock</a:t>
+            </a:r>
+          </a:p>
+          <a:p>
+            <a:pPr marL="0" indent="0" algn="ctr">
+              <a:buNone/>
+            </a:pPr>
+            <a:r>
+              <a:rPr lang="ko-KR" altLang="en-US" dirty="0" smtClean="0"/>
+              <a:t>게임 내 생존시간 증가</a:t>
+            </a:r>
+            <a:endParaRPr lang="en-US" altLang="ko-KR" dirty="0" smtClean="0"/>
+          </a:p>
+          <a:p>
+            <a:pPr marL="0" indent="0" algn="ctr">
+              <a:buNone/>
+            </a:pPr>
+            <a:r>
+              <a:rPr lang="ko-KR" altLang="en-US" dirty="0" smtClean="0"/>
+              <a:t>이동 가능한 </a:t>
+            </a:r>
+            <a:r>
+              <a:rPr lang="en-US" altLang="ko-KR" smtClean="0"/>
+              <a:t>Map </a:t>
+            </a:r>
+            <a:r>
+              <a:rPr lang="ko-KR" altLang="en-US" smtClean="0"/>
+              <a:t>범위 확대</a:t>
+            </a:r>
+            <a:endParaRPr lang="en-US" altLang="ko-KR" dirty="0" smtClean="0"/>
+          </a:p>
+        </p:txBody>
+      </p:sp>
+    </p:spTree>
+    <p:extLst>
+      <p:ext uri="{BB962C8B-B14F-4D97-AF65-F5344CB8AC3E}">
+        <p14:creationId xmlns:p14="http://schemas.microsoft.com/office/powerpoint/2010/main" val="1761270093"/>
+      </p:ext>
+    </p:extLst>
+  </p:cSld>
+  <p:clrMapOvr>
+    <a:masterClrMapping/>
+  </p:clrMapOvr>
+  <p:timing>
+    <p:tnLst>
+      <p:par>
+        <p:cTn id="1" dur="indefinite" restart="never" nodeType="tmRoot"/>
+      </p:par>
+    </p:tnLst>
+  </p:timing>
+</p:sld>
+</file>
+
+<file path=ppt/slides/slide7.xml><?xml version="1.0" encoding="utf-8"?>
+<p:sld xmlns:a="http://schemas.openxmlformats.org/drawingml/2006/main" xmlns:r="http://schemas.openxmlformats.org/officeDocument/2006/relationships" xmlns:p="http://schemas.openxmlformats.org/presentationml/2006/main">
+  <p:cSld>
+    <p:spTree>
+      <p:nvGrpSpPr>
+        <p:cNvPr id="1" name=""/>
+        <p:cNvGrpSpPr/>
+        <p:nvPr/>
+      </p:nvGrpSpPr>
+      <p:grpSpPr>
+        <a:xfrm>
+          <a:off x="0" y="0"/>
+          <a:ext cx="0" cy="0"/>
+          <a:chOff x="0" y="0"/>
+          <a:chExt cx="0" cy="0"/>
+        </a:xfrm>
+      </p:grpSpPr>
       <p:sp>
         <p:nvSpPr>
           <p:cNvPr id="6" name="직사각형 5"/>
@@ -4252,7 +4634,6 @@
               <a:rPr lang="en-US" altLang="ko-KR" sz="4000" dirty="0" smtClean="0"/>
               <a:t>nd any questions?</a:t>
             </a:r>
-            <a:endParaRPr lang="en-US" altLang="ko-KR" sz="4000" dirty="0" smtClean="0"/>
           </a:p>
         </p:txBody>
       </p:sp>
@@ -4276,7 +4657,7 @@
 </p:sld>
 </file>
 
-<file path=ppt/slides/slide7.xml><?xml version="1.0" encoding="utf-8"?>
+<file path=ppt/slides/slide8.xml><?xml version="1.0" encoding="utf-8"?>
 <p:sld xmlns:a="http://schemas.openxmlformats.org/drawingml/2006/main" xmlns:r="http://schemas.openxmlformats.org/officeDocument/2006/relationships" xmlns:p="http://schemas.openxmlformats.org/presentationml/2006/main">
   <p:cSld>
     <p:spTree>

</xml_diff>

<commit_message>
Bug Fix, Tutorial Text UI added
</commit_message>
<xml_diff>
--- a/Documentation/D.pptx
+++ b/Documentation/D.pptx
@@ -5,14 +5,17 @@
     <p:sldMasterId id="2147483660" r:id="rId1"/>
   </p:sldMasterIdLst>
   <p:sldIdLst>
-    <p:sldId id="256" r:id="rId2"/>
-    <p:sldId id="265" r:id="rId3"/>
-    <p:sldId id="257" r:id="rId4"/>
+    <p:sldId id="267" r:id="rId2"/>
+    <p:sldId id="268" r:id="rId3"/>
+    <p:sldId id="270" r:id="rId4"/>
     <p:sldId id="260" r:id="rId5"/>
     <p:sldId id="266" r:id="rId6"/>
-    <p:sldId id="261" r:id="rId7"/>
-    <p:sldId id="263" r:id="rId8"/>
-    <p:sldId id="262" r:id="rId9"/>
+    <p:sldId id="273" r:id="rId7"/>
+    <p:sldId id="274" r:id="rId8"/>
+    <p:sldId id="261" r:id="rId9"/>
+    <p:sldId id="271" r:id="rId10"/>
+    <p:sldId id="272" r:id="rId11"/>
+    <p:sldId id="263" r:id="rId12"/>
   </p:sldIdLst>
   <p:sldSz cx="9144000" cy="6858000" type="screen4x3"/>
   <p:notesSz cx="6858000" cy="9144000"/>
@@ -250,7 +253,7 @@
           <a:p>
             <a:fld id="{4FAB21EB-B974-477C-9123-77FDF6646BD7}" type="datetimeFigureOut">
               <a:rPr lang="ko-KR" altLang="en-US" smtClean="0"/>
-              <a:t>2017-01-19</a:t>
+              <a:t>2017-01-21</a:t>
             </a:fld>
             <a:endParaRPr lang="ko-KR" altLang="en-US"/>
           </a:p>
@@ -507,7 +510,7 @@
           <a:p>
             <a:fld id="{4FAB21EB-B974-477C-9123-77FDF6646BD7}" type="datetimeFigureOut">
               <a:rPr lang="ko-KR" altLang="en-US" smtClean="0"/>
-              <a:t>2017-01-19</a:t>
+              <a:t>2017-01-21</a:t>
             </a:fld>
             <a:endParaRPr lang="ko-KR" altLang="en-US"/>
           </a:p>
@@ -677,7 +680,7 @@
           <a:p>
             <a:fld id="{4FAB21EB-B974-477C-9123-77FDF6646BD7}" type="datetimeFigureOut">
               <a:rPr lang="ko-KR" altLang="en-US" smtClean="0"/>
-              <a:t>2017-01-19</a:t>
+              <a:t>2017-01-21</a:t>
             </a:fld>
             <a:endParaRPr lang="ko-KR" altLang="en-US"/>
           </a:p>
@@ -857,7 +860,7 @@
           <a:p>
             <a:fld id="{4FAB21EB-B974-477C-9123-77FDF6646BD7}" type="datetimeFigureOut">
               <a:rPr lang="ko-KR" altLang="en-US" smtClean="0"/>
-              <a:t>2017-01-19</a:t>
+              <a:t>2017-01-21</a:t>
             </a:fld>
             <a:endParaRPr lang="ko-KR" altLang="en-US"/>
           </a:p>
@@ -1107,7 +1110,7 @@
           <a:p>
             <a:fld id="{4FAB21EB-B974-477C-9123-77FDF6646BD7}" type="datetimeFigureOut">
               <a:rPr lang="ko-KR" altLang="en-US" smtClean="0"/>
-              <a:t>2017-01-19</a:t>
+              <a:t>2017-01-21</a:t>
             </a:fld>
             <a:endParaRPr lang="ko-KR" altLang="en-US"/>
           </a:p>
@@ -1192,52 +1195,30 @@
           <a:chExt cx="0" cy="0"/>
         </a:xfrm>
       </p:grpSpPr>
-      <p:sp>
-        <p:nvSpPr>
-          <p:cNvPr id="7" name="직사각형 6"/>
-          <p:cNvSpPr/>
+      <p:pic>
+        <p:nvPicPr>
+          <p:cNvPr id="8" name="그림 7"/>
+          <p:cNvPicPr>
+            <a:picLocks noChangeAspect="1"/>
+          </p:cNvPicPr>
           <p:nvPr userDrawn="1"/>
-        </p:nvSpPr>
+        </p:nvPicPr>
+        <p:blipFill>
+          <a:blip r:embed="rId2"/>
+          <a:stretch>
+            <a:fillRect/>
+          </a:stretch>
+        </p:blipFill>
         <p:spPr>
           <a:xfrm>
-            <a:off x="0" y="0"/>
-            <a:ext cx="3756454" cy="6858000"/>
+            <a:off x="4220" y="0"/>
+            <a:ext cx="3857625" cy="6858000"/>
           </a:xfrm>
           <a:prstGeom prst="rect">
             <a:avLst/>
           </a:prstGeom>
-          <a:solidFill>
-            <a:schemeClr val="tx1"/>
-          </a:solidFill>
-          <a:ln>
-            <a:noFill/>
-          </a:ln>
         </p:spPr>
-        <p:style>
-          <a:lnRef idx="2">
-            <a:schemeClr val="accent1">
-              <a:shade val="50000"/>
-            </a:schemeClr>
-          </a:lnRef>
-          <a:fillRef idx="1">
-            <a:schemeClr val="accent1"/>
-          </a:fillRef>
-          <a:effectRef idx="0">
-            <a:schemeClr val="accent1"/>
-          </a:effectRef>
-          <a:fontRef idx="minor">
-            <a:schemeClr val="lt1"/>
-          </a:fontRef>
-        </p:style>
-        <p:txBody>
-          <a:bodyPr rtlCol="0" anchor="ctr"/>
-          <a:lstStyle/>
-          <a:p>
-            <a:pPr algn="ctr"/>
-            <a:endParaRPr lang="ko-KR" altLang="en-US"/>
-          </a:p>
-        </p:txBody>
-      </p:sp>
+      </p:pic>
       <p:sp>
         <p:nvSpPr>
           <p:cNvPr id="2" name="Title 1"/>
@@ -1250,7 +1231,7 @@
         </p:nvSpPr>
         <p:spPr>
           <a:xfrm>
-            <a:off x="4094205" y="1747151"/>
+            <a:off x="4196681" y="1747151"/>
             <a:ext cx="4421144" cy="1325563"/>
           </a:xfrm>
         </p:spPr>
@@ -1288,7 +1269,7 @@
         </p:nvSpPr>
         <p:spPr>
           <a:xfrm>
-            <a:off x="4094205" y="3072714"/>
+            <a:off x="4196681" y="3072714"/>
             <a:ext cx="4421144" cy="3104249"/>
           </a:xfrm>
         </p:spPr>
@@ -1368,7 +1349,7 @@
           <a:p>
             <a:fld id="{4FAB21EB-B974-477C-9123-77FDF6646BD7}" type="datetimeFigureOut">
               <a:rPr lang="ko-KR" altLang="en-US" smtClean="0"/>
-              <a:t>2017-01-19</a:t>
+              <a:t>2017-01-21</a:t>
             </a:fld>
             <a:endParaRPr lang="ko-KR" altLang="en-US"/>
           </a:p>
@@ -1619,7 +1600,7 @@
           <a:p>
             <a:fld id="{4FAB21EB-B974-477C-9123-77FDF6646BD7}" type="datetimeFigureOut">
               <a:rPr lang="ko-KR" altLang="en-US" smtClean="0"/>
-              <a:t>2017-01-19</a:t>
+              <a:t>2017-01-21</a:t>
             </a:fld>
             <a:endParaRPr lang="ko-KR" altLang="en-US"/>
           </a:p>
@@ -1858,7 +1839,7 @@
           <a:p>
             <a:fld id="{4FAB21EB-B974-477C-9123-77FDF6646BD7}" type="datetimeFigureOut">
               <a:rPr lang="ko-KR" altLang="en-US" smtClean="0"/>
-              <a:t>2017-01-19</a:t>
+              <a:t>2017-01-21</a:t>
             </a:fld>
             <a:endParaRPr lang="ko-KR" altLang="en-US"/>
           </a:p>
@@ -2225,7 +2206,7 @@
           <a:p>
             <a:fld id="{4FAB21EB-B974-477C-9123-77FDF6646BD7}" type="datetimeFigureOut">
               <a:rPr lang="ko-KR" altLang="en-US" smtClean="0"/>
-              <a:t>2017-01-19</a:t>
+              <a:t>2017-01-21</a:t>
             </a:fld>
             <a:endParaRPr lang="ko-KR" altLang="en-US"/>
           </a:p>
@@ -2343,7 +2324,7 @@
           <a:p>
             <a:fld id="{4FAB21EB-B974-477C-9123-77FDF6646BD7}" type="datetimeFigureOut">
               <a:rPr lang="ko-KR" altLang="en-US" smtClean="0"/>
-              <a:t>2017-01-19</a:t>
+              <a:t>2017-01-21</a:t>
             </a:fld>
             <a:endParaRPr lang="ko-KR" altLang="en-US"/>
           </a:p>
@@ -2438,7 +2419,7 @@
           <a:p>
             <a:fld id="{4FAB21EB-B974-477C-9123-77FDF6646BD7}" type="datetimeFigureOut">
               <a:rPr lang="ko-KR" altLang="en-US" smtClean="0"/>
-              <a:t>2017-01-19</a:t>
+              <a:t>2017-01-21</a:t>
             </a:fld>
             <a:endParaRPr lang="ko-KR" altLang="en-US"/>
           </a:p>
@@ -2715,7 +2696,7 @@
           <a:p>
             <a:fld id="{4FAB21EB-B974-477C-9123-77FDF6646BD7}" type="datetimeFigureOut">
               <a:rPr lang="ko-KR" altLang="en-US" smtClean="0"/>
-              <a:t>2017-01-19</a:t>
+              <a:t>2017-01-21</a:t>
             </a:fld>
             <a:endParaRPr lang="ko-KR" altLang="en-US"/>
           </a:p>
@@ -2928,7 +2909,7 @@
           <a:p>
             <a:fld id="{4FAB21EB-B974-477C-9123-77FDF6646BD7}" type="datetimeFigureOut">
               <a:rPr lang="ko-KR" altLang="en-US" smtClean="0"/>
-              <a:t>2017-01-19</a:t>
+              <a:t>2017-01-21</a:t>
             </a:fld>
             <a:endParaRPr lang="ko-KR" altLang="en-US"/>
           </a:p>
@@ -3383,7 +3364,7 @@
         </p:nvSpPr>
         <p:spPr>
           <a:xfrm>
-            <a:off x="685800" y="2662573"/>
+            <a:off x="685800" y="2338933"/>
             <a:ext cx="7772400" cy="2387600"/>
           </a:xfrm>
         </p:spPr>
@@ -3394,29 +3375,26 @@
           <a:lstStyle/>
           <a:p>
             <a:r>
-              <a:rPr lang="en-US" altLang="ko-KR" sz="13800" dirty="0" smtClean="0">
+              <a:rPr lang="en-US" altLang="ko-KR" sz="11500" dirty="0" smtClean="0">
                 <a:solidFill>
                   <a:schemeClr val="bg1"/>
                 </a:solidFill>
-                <a:latin typeface="Sakkal Majalla" panose="02000000000000000000" pitchFamily="2" charset="-78"/>
-                <a:ea typeface="Adobe Kaiti Std R" panose="02020400000000000000" pitchFamily="18" charset="-128"/>
-                <a:cs typeface="Sakkal Majalla" panose="02000000000000000000" pitchFamily="2" charset="-78"/>
+                <a:latin typeface="SketchFlow Print" panose="02000000000000000000" pitchFamily="2" charset="0"/>
               </a:rPr>
               <a:t>D</a:t>
             </a:r>
-            <a:endParaRPr lang="ko-KR" altLang="en-US" sz="13800" dirty="0">
+            <a:endParaRPr lang="ko-KR" altLang="en-US" sz="11500" dirty="0">
               <a:solidFill>
                 <a:schemeClr val="bg1"/>
               </a:solidFill>
-              <a:latin typeface="Sakkal Majalla" panose="02000000000000000000" pitchFamily="2" charset="-78"/>
-              <a:cs typeface="Sakkal Majalla" panose="02000000000000000000" pitchFamily="2" charset="-78"/>
+              <a:latin typeface="SketchFlow Print" panose="02000000000000000000" pitchFamily="2" charset="0"/>
             </a:endParaRPr>
           </a:p>
         </p:txBody>
       </p:sp>
       <p:sp>
         <p:nvSpPr>
-          <p:cNvPr id="3" name="부제목 2"/>
+          <p:cNvPr id="5" name="부제목 2"/>
           <p:cNvSpPr>
             <a:spLocks noGrp="1"/>
           </p:cNvSpPr>
@@ -3452,17 +3430,27 @@
                 <a:latin typeface="Sakkal Majalla" panose="02000000000000000000" pitchFamily="2" charset="-78"/>
                 <a:cs typeface="Sakkal Majalla" panose="02000000000000000000" pitchFamily="2" charset="-78"/>
               </a:rPr>
-              <a:t>Line Plus X </a:t>
+              <a:t>Line Plus </a:t>
             </a:r>
             <a:r>
               <a:rPr lang="en-US" altLang="ko-KR" sz="3600" dirty="0" smtClean="0">
                 <a:solidFill>
-                  <a:schemeClr val="bg1"/>
+                  <a:srgbClr val="3B6D71"/>
                 </a:solidFill>
                 <a:latin typeface="Sakkal Majalla" panose="02000000000000000000" pitchFamily="2" charset="-78"/>
                 <a:cs typeface="Sakkal Majalla" panose="02000000000000000000" pitchFamily="2" charset="-78"/>
               </a:rPr>
-              <a:t>CATDOG</a:t>
+              <a:t>X</a:t>
+            </a:r>
+            <a:r>
+              <a:rPr lang="en-US" altLang="ko-KR" sz="3600" dirty="0" smtClean="0">
+                <a:solidFill>
+                  <a:schemeClr val="bg1"/>
+                </a:solidFill>
+                <a:latin typeface="Sakkal Majalla" panose="02000000000000000000" pitchFamily="2" charset="-78"/>
+                <a:cs typeface="Sakkal Majalla" panose="02000000000000000000" pitchFamily="2" charset="-78"/>
+              </a:rPr>
+              <a:t> CATDOG</a:t>
             </a:r>
           </a:p>
           <a:p>
@@ -3482,24 +3470,546 @@
                 <a:latin typeface="Sakkal Majalla" panose="02000000000000000000" pitchFamily="2" charset="-78"/>
                 <a:cs typeface="Sakkal Majalla" panose="02000000000000000000" pitchFamily="2" charset="-78"/>
               </a:rPr>
-              <a:t>2</a:t>
-            </a:r>
-            <a:r>
-              <a:rPr lang="en-US" altLang="ko-KR" sz="2000" dirty="0" smtClean="0">
+              <a:t>2D Mobile Adventure Game</a:t>
+            </a:r>
+          </a:p>
+        </p:txBody>
+      </p:sp>
+    </p:spTree>
+    <p:extLst>
+      <p:ext uri="{BB962C8B-B14F-4D97-AF65-F5344CB8AC3E}">
+        <p14:creationId xmlns:p14="http://schemas.microsoft.com/office/powerpoint/2010/main" val="1483849711"/>
+      </p:ext>
+    </p:extLst>
+  </p:cSld>
+  <p:clrMapOvr>
+    <a:masterClrMapping/>
+  </p:clrMapOvr>
+  <p:timing>
+    <p:tnLst>
+      <p:par>
+        <p:cTn id="1" dur="indefinite" restart="never" nodeType="tmRoot"/>
+      </p:par>
+    </p:tnLst>
+  </p:timing>
+</p:sld>
+</file>
+
+<file path=ppt/slides/slide10.xml><?xml version="1.0" encoding="utf-8"?>
+<p:sld xmlns:a="http://schemas.openxmlformats.org/drawingml/2006/main" xmlns:r="http://schemas.openxmlformats.org/officeDocument/2006/relationships" xmlns:p="http://schemas.openxmlformats.org/presentationml/2006/main">
+  <p:cSld>
+    <p:bg>
+      <p:bgPr>
+        <a:solidFill>
+          <a:schemeClr val="tx1"/>
+        </a:solidFill>
+        <a:effectLst/>
+      </p:bgPr>
+    </p:bg>
+    <p:spTree>
+      <p:nvGrpSpPr>
+        <p:cNvPr id="1" name=""/>
+        <p:cNvGrpSpPr/>
+        <p:nvPr/>
+      </p:nvGrpSpPr>
+      <p:grpSpPr>
+        <a:xfrm>
+          <a:off x="0" y="0"/>
+          <a:ext cx="0" cy="0"/>
+          <a:chOff x="0" y="0"/>
+          <a:chExt cx="0" cy="0"/>
+        </a:xfrm>
+      </p:grpSpPr>
+      <p:sp>
+        <p:nvSpPr>
+          <p:cNvPr id="2" name="제목 1"/>
+          <p:cNvSpPr>
+            <a:spLocks noGrp="1"/>
+          </p:cNvSpPr>
+          <p:nvPr>
+            <p:ph type="title"/>
+          </p:nvPr>
+        </p:nvSpPr>
+        <p:spPr>
+          <a:xfrm>
+            <a:off x="4094205" y="620250"/>
+            <a:ext cx="4421144" cy="1325563"/>
+          </a:xfrm>
+        </p:spPr>
+        <p:txBody>
+          <a:bodyPr/>
+          <a:lstStyle/>
+          <a:p>
+            <a:r>
+              <a:rPr lang="en-US" altLang="ko-KR" dirty="0" smtClean="0">
                 <a:solidFill>
                   <a:schemeClr val="bg1"/>
                 </a:solidFill>
-                <a:latin typeface="Sakkal Majalla" panose="02000000000000000000" pitchFamily="2" charset="-78"/>
-                <a:cs typeface="Sakkal Majalla" panose="02000000000000000000" pitchFamily="2" charset="-78"/>
               </a:rPr>
-              <a:t>D Mobile Adventure Game</a:t>
-            </a:r>
-            <a:endParaRPr lang="en-US" altLang="ko-KR" sz="2000" dirty="0" smtClean="0">
+              <a:t>Development Progress</a:t>
+            </a:r>
+            <a:endParaRPr lang="ko-KR" altLang="en-US" dirty="0">
               <a:solidFill>
                 <a:schemeClr val="bg1"/>
               </a:solidFill>
-              <a:latin typeface="Sakkal Majalla" panose="02000000000000000000" pitchFamily="2" charset="-78"/>
-              <a:cs typeface="Sakkal Majalla" panose="02000000000000000000" pitchFamily="2" charset="-78"/>
+            </a:endParaRPr>
+          </a:p>
+        </p:txBody>
+      </p:sp>
+      <p:sp>
+        <p:nvSpPr>
+          <p:cNvPr id="3" name="내용 개체 틀 2"/>
+          <p:cNvSpPr>
+            <a:spLocks noGrp="1"/>
+          </p:cNvSpPr>
+          <p:nvPr>
+            <p:ph idx="1"/>
+          </p:nvPr>
+        </p:nvSpPr>
+        <p:spPr>
+          <a:xfrm>
+            <a:off x="4094205" y="2092816"/>
+            <a:ext cx="4856612" cy="4084147"/>
+          </a:xfrm>
+        </p:spPr>
+        <p:txBody>
+          <a:bodyPr/>
+          <a:lstStyle/>
+          <a:p>
+            <a:pPr marL="0" indent="0" algn="l">
+              <a:buNone/>
+            </a:pPr>
+            <a:r>
+              <a:rPr lang="en-US" altLang="ko-KR" dirty="0" smtClean="0">
+                <a:solidFill>
+                  <a:schemeClr val="bg1"/>
+                </a:solidFill>
+              </a:rPr>
+              <a:t>			Core	Resource</a:t>
+            </a:r>
+          </a:p>
+          <a:p>
+            <a:pPr algn="l"/>
+            <a:r>
+              <a:rPr lang="en-US" altLang="ko-KR" dirty="0" smtClean="0">
+                <a:solidFill>
+                  <a:schemeClr val="bg1"/>
+                </a:solidFill>
+              </a:rPr>
+              <a:t>Story			</a:t>
+            </a:r>
+            <a:r>
+              <a:rPr lang="en-US" altLang="ko-KR" dirty="0" smtClean="0">
+                <a:solidFill>
+                  <a:schemeClr val="accent6">
+                    <a:lumMod val="75000"/>
+                  </a:schemeClr>
+                </a:solidFill>
+              </a:rPr>
+              <a:t>Doing</a:t>
+            </a:r>
+            <a:r>
+              <a:rPr lang="en-US" altLang="ko-KR" dirty="0" smtClean="0">
+                <a:solidFill>
+                  <a:schemeClr val="bg1"/>
+                </a:solidFill>
+              </a:rPr>
+              <a:t>	</a:t>
+            </a:r>
+            <a:r>
+              <a:rPr lang="en-US" altLang="ko-KR" dirty="0" smtClean="0">
+                <a:solidFill>
+                  <a:srgbClr val="FF4B4B"/>
+                </a:solidFill>
+              </a:rPr>
+              <a:t> to do</a:t>
+            </a:r>
+          </a:p>
+          <a:p>
+            <a:pPr algn="l"/>
+            <a:r>
+              <a:rPr lang="en-US" altLang="ko-KR" dirty="0" smtClean="0">
+                <a:solidFill>
+                  <a:schemeClr val="bg1"/>
+                </a:solidFill>
+              </a:rPr>
+              <a:t>Tutorial		</a:t>
+            </a:r>
+            <a:r>
+              <a:rPr lang="en-US" altLang="ko-KR" dirty="0" smtClean="0">
+                <a:solidFill>
+                  <a:schemeClr val="accent1">
+                    <a:lumMod val="75000"/>
+                  </a:schemeClr>
+                </a:solidFill>
+              </a:rPr>
+              <a:t>Done</a:t>
+            </a:r>
+            <a:r>
+              <a:rPr lang="en-US" altLang="ko-KR" dirty="0" smtClean="0">
+                <a:solidFill>
+                  <a:schemeClr val="bg1"/>
+                </a:solidFill>
+              </a:rPr>
+              <a:t>	</a:t>
+            </a:r>
+            <a:r>
+              <a:rPr lang="en-US" altLang="ko-KR" dirty="0">
+                <a:solidFill>
+                  <a:schemeClr val="bg1"/>
+                </a:solidFill>
+              </a:rPr>
+              <a:t> </a:t>
+            </a:r>
+            <a:r>
+              <a:rPr lang="en-US" altLang="ko-KR" dirty="0" smtClean="0">
+                <a:solidFill>
+                  <a:schemeClr val="accent6">
+                    <a:lumMod val="75000"/>
+                  </a:schemeClr>
+                </a:solidFill>
+              </a:rPr>
+              <a:t>Doing</a:t>
+            </a:r>
+          </a:p>
+          <a:p>
+            <a:pPr algn="l"/>
+            <a:r>
+              <a:rPr lang="en-US" altLang="ko-KR" dirty="0" smtClean="0">
+                <a:solidFill>
+                  <a:schemeClr val="bg1"/>
+                </a:solidFill>
+              </a:rPr>
+              <a:t>Tutorial Menu		</a:t>
+            </a:r>
+            <a:r>
+              <a:rPr lang="en-US" altLang="ko-KR" dirty="0" smtClean="0">
+                <a:solidFill>
+                  <a:schemeClr val="accent6">
+                    <a:lumMod val="75000"/>
+                  </a:schemeClr>
+                </a:solidFill>
+              </a:rPr>
+              <a:t>Doing</a:t>
+            </a:r>
+            <a:r>
+              <a:rPr lang="en-US" altLang="ko-KR" dirty="0" smtClean="0">
+                <a:solidFill>
+                  <a:schemeClr val="bg1"/>
+                </a:solidFill>
+              </a:rPr>
+              <a:t>	</a:t>
+            </a:r>
+            <a:r>
+              <a:rPr lang="en-US" altLang="ko-KR" dirty="0">
+                <a:solidFill>
+                  <a:schemeClr val="bg1"/>
+                </a:solidFill>
+              </a:rPr>
+              <a:t> </a:t>
+            </a:r>
+            <a:r>
+              <a:rPr lang="en-US" altLang="ko-KR" dirty="0">
+                <a:solidFill>
+                  <a:srgbClr val="FF4B4B"/>
+                </a:solidFill>
+              </a:rPr>
+              <a:t>to do</a:t>
+            </a:r>
+            <a:endParaRPr lang="en-US" altLang="ko-KR" dirty="0" smtClean="0">
+              <a:solidFill>
+                <a:srgbClr val="FF4B4B"/>
+              </a:solidFill>
+            </a:endParaRPr>
+          </a:p>
+          <a:p>
+            <a:pPr algn="l"/>
+            <a:r>
+              <a:rPr lang="en-US" altLang="ko-KR" dirty="0" smtClean="0">
+                <a:solidFill>
+                  <a:schemeClr val="bg1"/>
+                </a:solidFill>
+              </a:rPr>
+              <a:t>Game			</a:t>
+            </a:r>
+            <a:r>
+              <a:rPr lang="en-US" altLang="ko-KR" dirty="0" smtClean="0">
+                <a:solidFill>
+                  <a:schemeClr val="accent6">
+                    <a:lumMod val="75000"/>
+                  </a:schemeClr>
+                </a:solidFill>
+              </a:rPr>
+              <a:t>Doing</a:t>
+            </a:r>
+            <a:r>
+              <a:rPr lang="en-US" altLang="ko-KR" dirty="0" smtClean="0">
+                <a:solidFill>
+                  <a:schemeClr val="bg1"/>
+                </a:solidFill>
+              </a:rPr>
+              <a:t>	</a:t>
+            </a:r>
+            <a:r>
+              <a:rPr lang="en-US" altLang="ko-KR" dirty="0">
+                <a:solidFill>
+                  <a:srgbClr val="FF4B4B"/>
+                </a:solidFill>
+              </a:rPr>
+              <a:t> to do</a:t>
+            </a:r>
+            <a:endParaRPr lang="en-US" altLang="ko-KR" dirty="0" smtClean="0">
+              <a:solidFill>
+                <a:srgbClr val="FF4B4B"/>
+              </a:solidFill>
+            </a:endParaRPr>
+          </a:p>
+          <a:p>
+            <a:pPr algn="l"/>
+            <a:r>
+              <a:rPr lang="en-US" altLang="ko-KR" dirty="0" smtClean="0">
+                <a:solidFill>
+                  <a:schemeClr val="bg1"/>
+                </a:solidFill>
+              </a:rPr>
+              <a:t>Shop			</a:t>
+            </a:r>
+            <a:r>
+              <a:rPr lang="en-US" altLang="ko-KR" dirty="0" smtClean="0">
+                <a:solidFill>
+                  <a:schemeClr val="accent1">
+                    <a:lumMod val="75000"/>
+                  </a:schemeClr>
+                </a:solidFill>
+              </a:rPr>
+              <a:t>Done</a:t>
+            </a:r>
+            <a:r>
+              <a:rPr lang="en-US" altLang="ko-KR" dirty="0" smtClean="0">
+                <a:solidFill>
+                  <a:schemeClr val="accent6">
+                    <a:lumMod val="75000"/>
+                  </a:schemeClr>
+                </a:solidFill>
+              </a:rPr>
+              <a:t>	</a:t>
+            </a:r>
+            <a:r>
+              <a:rPr lang="en-US" altLang="ko-KR" dirty="0">
+                <a:solidFill>
+                  <a:schemeClr val="accent6">
+                    <a:lumMod val="75000"/>
+                  </a:schemeClr>
+                </a:solidFill>
+              </a:rPr>
+              <a:t> Doing</a:t>
+            </a:r>
+            <a:endParaRPr lang="en-US" altLang="ko-KR" dirty="0" smtClean="0">
+              <a:solidFill>
+                <a:schemeClr val="accent6">
+                  <a:lumMod val="75000"/>
+                </a:schemeClr>
+              </a:solidFill>
+            </a:endParaRPr>
+          </a:p>
+          <a:p>
+            <a:pPr algn="l"/>
+            <a:r>
+              <a:rPr lang="en-US" altLang="ko-KR" dirty="0" smtClean="0">
+                <a:solidFill>
+                  <a:schemeClr val="bg1"/>
+                </a:solidFill>
+              </a:rPr>
+              <a:t>Inventory		</a:t>
+            </a:r>
+            <a:r>
+              <a:rPr lang="en-US" altLang="ko-KR" dirty="0" smtClean="0">
+                <a:solidFill>
+                  <a:schemeClr val="accent1">
+                    <a:lumMod val="75000"/>
+                  </a:schemeClr>
+                </a:solidFill>
+              </a:rPr>
+              <a:t>Done</a:t>
+            </a:r>
+            <a:r>
+              <a:rPr lang="en-US" altLang="ko-KR" dirty="0" smtClean="0">
+                <a:solidFill>
+                  <a:schemeClr val="accent6">
+                    <a:lumMod val="75000"/>
+                  </a:schemeClr>
+                </a:solidFill>
+              </a:rPr>
+              <a:t>	</a:t>
+            </a:r>
+            <a:r>
+              <a:rPr lang="en-US" altLang="ko-KR" dirty="0">
+                <a:solidFill>
+                  <a:schemeClr val="accent6">
+                    <a:lumMod val="75000"/>
+                  </a:schemeClr>
+                </a:solidFill>
+              </a:rPr>
+              <a:t> Doing</a:t>
+            </a:r>
+            <a:endParaRPr lang="en-US" altLang="ko-KR" dirty="0" smtClean="0">
+              <a:solidFill>
+                <a:schemeClr val="accent6">
+                  <a:lumMod val="75000"/>
+                </a:schemeClr>
+              </a:solidFill>
+            </a:endParaRPr>
+          </a:p>
+          <a:p>
+            <a:pPr algn="l"/>
+            <a:r>
+              <a:rPr lang="en-US" altLang="ko-KR" dirty="0" smtClean="0">
+                <a:solidFill>
+                  <a:schemeClr val="bg1"/>
+                </a:solidFill>
+              </a:rPr>
+              <a:t>Unlock			</a:t>
+            </a:r>
+            <a:r>
+              <a:rPr lang="en-US" altLang="ko-KR" dirty="0" smtClean="0">
+                <a:solidFill>
+                  <a:schemeClr val="accent1">
+                    <a:lumMod val="75000"/>
+                  </a:schemeClr>
+                </a:solidFill>
+              </a:rPr>
+              <a:t>Done</a:t>
+            </a:r>
+            <a:r>
+              <a:rPr lang="en-US" altLang="ko-KR" dirty="0" smtClean="0">
+                <a:solidFill>
+                  <a:schemeClr val="bg1"/>
+                </a:solidFill>
+              </a:rPr>
+              <a:t>	</a:t>
+            </a:r>
+            <a:r>
+              <a:rPr lang="en-US" altLang="ko-KR" dirty="0">
+                <a:solidFill>
+                  <a:schemeClr val="bg1"/>
+                </a:solidFill>
+              </a:rPr>
+              <a:t> </a:t>
+            </a:r>
+            <a:r>
+              <a:rPr lang="en-US" altLang="ko-KR" dirty="0">
+                <a:solidFill>
+                  <a:srgbClr val="FF4B4B"/>
+                </a:solidFill>
+              </a:rPr>
+              <a:t>to do</a:t>
+            </a:r>
+            <a:endParaRPr lang="en-US" altLang="ko-KR" dirty="0" smtClean="0">
+              <a:solidFill>
+                <a:srgbClr val="FF4B4B"/>
+              </a:solidFill>
+            </a:endParaRPr>
+          </a:p>
+          <a:p>
+            <a:pPr algn="l"/>
+            <a:r>
+              <a:rPr lang="en-US" altLang="ko-KR" dirty="0" smtClean="0">
+                <a:solidFill>
+                  <a:schemeClr val="bg1"/>
+                </a:solidFill>
+              </a:rPr>
+              <a:t>Setting			</a:t>
+            </a:r>
+            <a:r>
+              <a:rPr lang="en-US" altLang="ko-KR" dirty="0" smtClean="0">
+                <a:solidFill>
+                  <a:srgbClr val="FF4B4B"/>
+                </a:solidFill>
+              </a:rPr>
+              <a:t>to </a:t>
+            </a:r>
+            <a:r>
+              <a:rPr lang="en-US" altLang="ko-KR" dirty="0">
+                <a:solidFill>
+                  <a:srgbClr val="FF4B4B"/>
+                </a:solidFill>
+              </a:rPr>
+              <a:t>do </a:t>
+            </a:r>
+            <a:r>
+              <a:rPr lang="en-US" altLang="ko-KR" dirty="0" smtClean="0">
+                <a:solidFill>
+                  <a:srgbClr val="FF4B4B"/>
+                </a:solidFill>
+              </a:rPr>
+              <a:t>	</a:t>
+            </a:r>
+            <a:r>
+              <a:rPr lang="en-US" altLang="ko-KR" dirty="0">
+                <a:solidFill>
+                  <a:srgbClr val="FF4B4B"/>
+                </a:solidFill>
+              </a:rPr>
+              <a:t> to do</a:t>
+            </a:r>
+            <a:endParaRPr lang="ko-KR" altLang="en-US" dirty="0">
+              <a:solidFill>
+                <a:srgbClr val="FF4B4B"/>
+              </a:solidFill>
+            </a:endParaRPr>
+          </a:p>
+        </p:txBody>
+      </p:sp>
+      <p:sp>
+        <p:nvSpPr>
+          <p:cNvPr id="4" name="직사각형 3"/>
+          <p:cNvSpPr/>
+          <p:nvPr/>
+        </p:nvSpPr>
+        <p:spPr>
+          <a:xfrm>
+            <a:off x="7339753" y="1510984"/>
+            <a:ext cx="1393330" cy="369332"/>
+          </a:xfrm>
+          <a:prstGeom prst="rect">
+            <a:avLst/>
+          </a:prstGeom>
+        </p:spPr>
+        <p:txBody>
+          <a:bodyPr wrap="none">
+            <a:spAutoFit/>
+          </a:bodyPr>
+          <a:lstStyle/>
+          <a:p>
+            <a:r>
+              <a:rPr lang="en-US" altLang="ko-KR" dirty="0" smtClean="0">
+                <a:solidFill>
+                  <a:schemeClr val="tx1">
+                    <a:lumMod val="75000"/>
+                    <a:lumOff val="25000"/>
+                  </a:schemeClr>
+                </a:solidFill>
+              </a:rPr>
+              <a:t>~ 2017</a:t>
+            </a:r>
+            <a:r>
+              <a:rPr lang="en-US" altLang="ko-KR" dirty="0">
+                <a:solidFill>
+                  <a:schemeClr val="tx1">
+                    <a:lumMod val="75000"/>
+                    <a:lumOff val="25000"/>
+                  </a:schemeClr>
+                </a:solidFill>
+              </a:rPr>
+              <a:t>. 1. 23</a:t>
+            </a:r>
+            <a:endParaRPr lang="ko-KR" altLang="en-US" dirty="0">
+              <a:solidFill>
+                <a:schemeClr val="tx1">
+                  <a:lumMod val="75000"/>
+                  <a:lumOff val="25000"/>
+                </a:schemeClr>
+              </a:solidFill>
             </a:endParaRPr>
           </a:p>
         </p:txBody>
@@ -3507,7 +4017,1218 @@
     </p:spTree>
     <p:extLst>
       <p:ext uri="{BB962C8B-B14F-4D97-AF65-F5344CB8AC3E}">
-        <p14:creationId xmlns:p14="http://schemas.microsoft.com/office/powerpoint/2010/main" val="1398033009"/>
+        <p14:creationId xmlns:p14="http://schemas.microsoft.com/office/powerpoint/2010/main" val="3761633737"/>
+      </p:ext>
+    </p:extLst>
+  </p:cSld>
+  <p:clrMapOvr>
+    <a:masterClrMapping/>
+  </p:clrMapOvr>
+  <p:timing>
+    <p:tnLst>
+      <p:par>
+        <p:cTn id="1" dur="indefinite" restart="never" nodeType="tmRoot">
+          <p:childTnLst>
+            <p:seq concurrent="1" nextAc="seek">
+              <p:cTn id="2" dur="indefinite" nodeType="mainSeq">
+                <p:childTnLst>
+                  <p:par>
+                    <p:cTn id="3" fill="hold">
+                      <p:stCondLst>
+                        <p:cond delay="indefinite"/>
+                      </p:stCondLst>
+                      <p:childTnLst>
+                        <p:par>
+                          <p:cTn id="4" fill="hold">
+                            <p:stCondLst>
+                              <p:cond delay="0"/>
+                            </p:stCondLst>
+                            <p:childTnLst>
+                              <p:par>
+                                <p:cTn id="5" presetID="42" presetClass="entr" presetSubtype="0" fill="hold" grpId="0" nodeType="clickEffect">
+                                  <p:stCondLst>
+                                    <p:cond delay="0"/>
+                                  </p:stCondLst>
+                                  <p:childTnLst>
+                                    <p:set>
+                                      <p:cBhvr>
+                                        <p:cTn id="6" dur="1" fill="hold">
+                                          <p:stCondLst>
+                                            <p:cond delay="0"/>
+                                          </p:stCondLst>
+                                        </p:cTn>
+                                        <p:tgtEl>
+                                          <p:spTgt spid="3">
+                                            <p:txEl>
+                                              <p:pRg st="0" end="0"/>
+                                            </p:txEl>
+                                          </p:spTgt>
+                                        </p:tgtEl>
+                                        <p:attrNameLst>
+                                          <p:attrName>style.visibility</p:attrName>
+                                        </p:attrNameLst>
+                                      </p:cBhvr>
+                                      <p:to>
+                                        <p:strVal val="visible"/>
+                                      </p:to>
+                                    </p:set>
+                                    <p:animEffect transition="in" filter="fade">
+                                      <p:cBhvr>
+                                        <p:cTn id="7" dur="500"/>
+                                        <p:tgtEl>
+                                          <p:spTgt spid="3">
+                                            <p:txEl>
+                                              <p:pRg st="0" end="0"/>
+                                            </p:txEl>
+                                          </p:spTgt>
+                                        </p:tgtEl>
+                                      </p:cBhvr>
+                                    </p:animEffect>
+                                    <p:anim calcmode="lin" valueType="num">
+                                      <p:cBhvr>
+                                        <p:cTn id="8" dur="500" fill="hold"/>
+                                        <p:tgtEl>
+                                          <p:spTgt spid="3">
+                                            <p:txEl>
+                                              <p:pRg st="0" end="0"/>
+                                            </p:txEl>
+                                          </p:spTgt>
+                                        </p:tgtEl>
+                                        <p:attrNameLst>
+                                          <p:attrName>ppt_x</p:attrName>
+                                        </p:attrNameLst>
+                                      </p:cBhvr>
+                                      <p:tavLst>
+                                        <p:tav tm="0">
+                                          <p:val>
+                                            <p:strVal val="#ppt_x"/>
+                                          </p:val>
+                                        </p:tav>
+                                        <p:tav tm="100000">
+                                          <p:val>
+                                            <p:strVal val="#ppt_x"/>
+                                          </p:val>
+                                        </p:tav>
+                                      </p:tavLst>
+                                    </p:anim>
+                                    <p:anim calcmode="lin" valueType="num">
+                                      <p:cBhvr>
+                                        <p:cTn id="9" dur="500" fill="hold"/>
+                                        <p:tgtEl>
+                                          <p:spTgt spid="3">
+                                            <p:txEl>
+                                              <p:pRg st="0" end="0"/>
+                                            </p:txEl>
+                                          </p:spTgt>
+                                        </p:tgtEl>
+                                        <p:attrNameLst>
+                                          <p:attrName>ppt_y</p:attrName>
+                                        </p:attrNameLst>
+                                      </p:cBhvr>
+                                      <p:tavLst>
+                                        <p:tav tm="0">
+                                          <p:val>
+                                            <p:strVal val="#ppt_y+.1"/>
+                                          </p:val>
+                                        </p:tav>
+                                        <p:tav tm="100000">
+                                          <p:val>
+                                            <p:strVal val="#ppt_y"/>
+                                          </p:val>
+                                        </p:tav>
+                                      </p:tavLst>
+                                    </p:anim>
+                                  </p:childTnLst>
+                                </p:cTn>
+                              </p:par>
+                            </p:childTnLst>
+                          </p:cTn>
+                        </p:par>
+                      </p:childTnLst>
+                    </p:cTn>
+                  </p:par>
+                  <p:par>
+                    <p:cTn id="10" fill="hold">
+                      <p:stCondLst>
+                        <p:cond delay="indefinite"/>
+                      </p:stCondLst>
+                      <p:childTnLst>
+                        <p:par>
+                          <p:cTn id="11" fill="hold">
+                            <p:stCondLst>
+                              <p:cond delay="0"/>
+                            </p:stCondLst>
+                            <p:childTnLst>
+                              <p:par>
+                                <p:cTn id="12" presetID="42" presetClass="entr" presetSubtype="0" fill="hold" grpId="0" nodeType="clickEffect">
+                                  <p:stCondLst>
+                                    <p:cond delay="0"/>
+                                  </p:stCondLst>
+                                  <p:childTnLst>
+                                    <p:set>
+                                      <p:cBhvr>
+                                        <p:cTn id="13" dur="1" fill="hold">
+                                          <p:stCondLst>
+                                            <p:cond delay="0"/>
+                                          </p:stCondLst>
+                                        </p:cTn>
+                                        <p:tgtEl>
+                                          <p:spTgt spid="3">
+                                            <p:txEl>
+                                              <p:pRg st="1" end="1"/>
+                                            </p:txEl>
+                                          </p:spTgt>
+                                        </p:tgtEl>
+                                        <p:attrNameLst>
+                                          <p:attrName>style.visibility</p:attrName>
+                                        </p:attrNameLst>
+                                      </p:cBhvr>
+                                      <p:to>
+                                        <p:strVal val="visible"/>
+                                      </p:to>
+                                    </p:set>
+                                    <p:animEffect transition="in" filter="fade">
+                                      <p:cBhvr>
+                                        <p:cTn id="14" dur="500"/>
+                                        <p:tgtEl>
+                                          <p:spTgt spid="3">
+                                            <p:txEl>
+                                              <p:pRg st="1" end="1"/>
+                                            </p:txEl>
+                                          </p:spTgt>
+                                        </p:tgtEl>
+                                      </p:cBhvr>
+                                    </p:animEffect>
+                                    <p:anim calcmode="lin" valueType="num">
+                                      <p:cBhvr>
+                                        <p:cTn id="15" dur="500" fill="hold"/>
+                                        <p:tgtEl>
+                                          <p:spTgt spid="3">
+                                            <p:txEl>
+                                              <p:pRg st="1" end="1"/>
+                                            </p:txEl>
+                                          </p:spTgt>
+                                        </p:tgtEl>
+                                        <p:attrNameLst>
+                                          <p:attrName>ppt_x</p:attrName>
+                                        </p:attrNameLst>
+                                      </p:cBhvr>
+                                      <p:tavLst>
+                                        <p:tav tm="0">
+                                          <p:val>
+                                            <p:strVal val="#ppt_x"/>
+                                          </p:val>
+                                        </p:tav>
+                                        <p:tav tm="100000">
+                                          <p:val>
+                                            <p:strVal val="#ppt_x"/>
+                                          </p:val>
+                                        </p:tav>
+                                      </p:tavLst>
+                                    </p:anim>
+                                    <p:anim calcmode="lin" valueType="num">
+                                      <p:cBhvr>
+                                        <p:cTn id="16" dur="500" fill="hold"/>
+                                        <p:tgtEl>
+                                          <p:spTgt spid="3">
+                                            <p:txEl>
+                                              <p:pRg st="1" end="1"/>
+                                            </p:txEl>
+                                          </p:spTgt>
+                                        </p:tgtEl>
+                                        <p:attrNameLst>
+                                          <p:attrName>ppt_y</p:attrName>
+                                        </p:attrNameLst>
+                                      </p:cBhvr>
+                                      <p:tavLst>
+                                        <p:tav tm="0">
+                                          <p:val>
+                                            <p:strVal val="#ppt_y+.1"/>
+                                          </p:val>
+                                        </p:tav>
+                                        <p:tav tm="100000">
+                                          <p:val>
+                                            <p:strVal val="#ppt_y"/>
+                                          </p:val>
+                                        </p:tav>
+                                      </p:tavLst>
+                                    </p:anim>
+                                  </p:childTnLst>
+                                </p:cTn>
+                              </p:par>
+                            </p:childTnLst>
+                          </p:cTn>
+                        </p:par>
+                      </p:childTnLst>
+                    </p:cTn>
+                  </p:par>
+                  <p:par>
+                    <p:cTn id="17" fill="hold">
+                      <p:stCondLst>
+                        <p:cond delay="indefinite"/>
+                      </p:stCondLst>
+                      <p:childTnLst>
+                        <p:par>
+                          <p:cTn id="18" fill="hold">
+                            <p:stCondLst>
+                              <p:cond delay="0"/>
+                            </p:stCondLst>
+                            <p:childTnLst>
+                              <p:par>
+                                <p:cTn id="19" presetID="42" presetClass="entr" presetSubtype="0" fill="hold" grpId="0" nodeType="clickEffect">
+                                  <p:stCondLst>
+                                    <p:cond delay="0"/>
+                                  </p:stCondLst>
+                                  <p:childTnLst>
+                                    <p:set>
+                                      <p:cBhvr>
+                                        <p:cTn id="20" dur="1" fill="hold">
+                                          <p:stCondLst>
+                                            <p:cond delay="0"/>
+                                          </p:stCondLst>
+                                        </p:cTn>
+                                        <p:tgtEl>
+                                          <p:spTgt spid="3">
+                                            <p:txEl>
+                                              <p:pRg st="2" end="2"/>
+                                            </p:txEl>
+                                          </p:spTgt>
+                                        </p:tgtEl>
+                                        <p:attrNameLst>
+                                          <p:attrName>style.visibility</p:attrName>
+                                        </p:attrNameLst>
+                                      </p:cBhvr>
+                                      <p:to>
+                                        <p:strVal val="visible"/>
+                                      </p:to>
+                                    </p:set>
+                                    <p:animEffect transition="in" filter="fade">
+                                      <p:cBhvr>
+                                        <p:cTn id="21" dur="500"/>
+                                        <p:tgtEl>
+                                          <p:spTgt spid="3">
+                                            <p:txEl>
+                                              <p:pRg st="2" end="2"/>
+                                            </p:txEl>
+                                          </p:spTgt>
+                                        </p:tgtEl>
+                                      </p:cBhvr>
+                                    </p:animEffect>
+                                    <p:anim calcmode="lin" valueType="num">
+                                      <p:cBhvr>
+                                        <p:cTn id="22" dur="500" fill="hold"/>
+                                        <p:tgtEl>
+                                          <p:spTgt spid="3">
+                                            <p:txEl>
+                                              <p:pRg st="2" end="2"/>
+                                            </p:txEl>
+                                          </p:spTgt>
+                                        </p:tgtEl>
+                                        <p:attrNameLst>
+                                          <p:attrName>ppt_x</p:attrName>
+                                        </p:attrNameLst>
+                                      </p:cBhvr>
+                                      <p:tavLst>
+                                        <p:tav tm="0">
+                                          <p:val>
+                                            <p:strVal val="#ppt_x"/>
+                                          </p:val>
+                                        </p:tav>
+                                        <p:tav tm="100000">
+                                          <p:val>
+                                            <p:strVal val="#ppt_x"/>
+                                          </p:val>
+                                        </p:tav>
+                                      </p:tavLst>
+                                    </p:anim>
+                                    <p:anim calcmode="lin" valueType="num">
+                                      <p:cBhvr>
+                                        <p:cTn id="23" dur="500" fill="hold"/>
+                                        <p:tgtEl>
+                                          <p:spTgt spid="3">
+                                            <p:txEl>
+                                              <p:pRg st="2" end="2"/>
+                                            </p:txEl>
+                                          </p:spTgt>
+                                        </p:tgtEl>
+                                        <p:attrNameLst>
+                                          <p:attrName>ppt_y</p:attrName>
+                                        </p:attrNameLst>
+                                      </p:cBhvr>
+                                      <p:tavLst>
+                                        <p:tav tm="0">
+                                          <p:val>
+                                            <p:strVal val="#ppt_y+.1"/>
+                                          </p:val>
+                                        </p:tav>
+                                        <p:tav tm="100000">
+                                          <p:val>
+                                            <p:strVal val="#ppt_y"/>
+                                          </p:val>
+                                        </p:tav>
+                                      </p:tavLst>
+                                    </p:anim>
+                                  </p:childTnLst>
+                                </p:cTn>
+                              </p:par>
+                            </p:childTnLst>
+                          </p:cTn>
+                        </p:par>
+                      </p:childTnLst>
+                    </p:cTn>
+                  </p:par>
+                  <p:par>
+                    <p:cTn id="24" fill="hold">
+                      <p:stCondLst>
+                        <p:cond delay="indefinite"/>
+                      </p:stCondLst>
+                      <p:childTnLst>
+                        <p:par>
+                          <p:cTn id="25" fill="hold">
+                            <p:stCondLst>
+                              <p:cond delay="0"/>
+                            </p:stCondLst>
+                            <p:childTnLst>
+                              <p:par>
+                                <p:cTn id="26" presetID="42" presetClass="entr" presetSubtype="0" fill="hold" grpId="0" nodeType="clickEffect">
+                                  <p:stCondLst>
+                                    <p:cond delay="0"/>
+                                  </p:stCondLst>
+                                  <p:childTnLst>
+                                    <p:set>
+                                      <p:cBhvr>
+                                        <p:cTn id="27" dur="1" fill="hold">
+                                          <p:stCondLst>
+                                            <p:cond delay="0"/>
+                                          </p:stCondLst>
+                                        </p:cTn>
+                                        <p:tgtEl>
+                                          <p:spTgt spid="3">
+                                            <p:txEl>
+                                              <p:pRg st="3" end="3"/>
+                                            </p:txEl>
+                                          </p:spTgt>
+                                        </p:tgtEl>
+                                        <p:attrNameLst>
+                                          <p:attrName>style.visibility</p:attrName>
+                                        </p:attrNameLst>
+                                      </p:cBhvr>
+                                      <p:to>
+                                        <p:strVal val="visible"/>
+                                      </p:to>
+                                    </p:set>
+                                    <p:animEffect transition="in" filter="fade">
+                                      <p:cBhvr>
+                                        <p:cTn id="28" dur="500"/>
+                                        <p:tgtEl>
+                                          <p:spTgt spid="3">
+                                            <p:txEl>
+                                              <p:pRg st="3" end="3"/>
+                                            </p:txEl>
+                                          </p:spTgt>
+                                        </p:tgtEl>
+                                      </p:cBhvr>
+                                    </p:animEffect>
+                                    <p:anim calcmode="lin" valueType="num">
+                                      <p:cBhvr>
+                                        <p:cTn id="29" dur="500" fill="hold"/>
+                                        <p:tgtEl>
+                                          <p:spTgt spid="3">
+                                            <p:txEl>
+                                              <p:pRg st="3" end="3"/>
+                                            </p:txEl>
+                                          </p:spTgt>
+                                        </p:tgtEl>
+                                        <p:attrNameLst>
+                                          <p:attrName>ppt_x</p:attrName>
+                                        </p:attrNameLst>
+                                      </p:cBhvr>
+                                      <p:tavLst>
+                                        <p:tav tm="0">
+                                          <p:val>
+                                            <p:strVal val="#ppt_x"/>
+                                          </p:val>
+                                        </p:tav>
+                                        <p:tav tm="100000">
+                                          <p:val>
+                                            <p:strVal val="#ppt_x"/>
+                                          </p:val>
+                                        </p:tav>
+                                      </p:tavLst>
+                                    </p:anim>
+                                    <p:anim calcmode="lin" valueType="num">
+                                      <p:cBhvr>
+                                        <p:cTn id="30" dur="500" fill="hold"/>
+                                        <p:tgtEl>
+                                          <p:spTgt spid="3">
+                                            <p:txEl>
+                                              <p:pRg st="3" end="3"/>
+                                            </p:txEl>
+                                          </p:spTgt>
+                                        </p:tgtEl>
+                                        <p:attrNameLst>
+                                          <p:attrName>ppt_y</p:attrName>
+                                        </p:attrNameLst>
+                                      </p:cBhvr>
+                                      <p:tavLst>
+                                        <p:tav tm="0">
+                                          <p:val>
+                                            <p:strVal val="#ppt_y+.1"/>
+                                          </p:val>
+                                        </p:tav>
+                                        <p:tav tm="100000">
+                                          <p:val>
+                                            <p:strVal val="#ppt_y"/>
+                                          </p:val>
+                                        </p:tav>
+                                      </p:tavLst>
+                                    </p:anim>
+                                  </p:childTnLst>
+                                </p:cTn>
+                              </p:par>
+                            </p:childTnLst>
+                          </p:cTn>
+                        </p:par>
+                      </p:childTnLst>
+                    </p:cTn>
+                  </p:par>
+                  <p:par>
+                    <p:cTn id="31" fill="hold">
+                      <p:stCondLst>
+                        <p:cond delay="indefinite"/>
+                      </p:stCondLst>
+                      <p:childTnLst>
+                        <p:par>
+                          <p:cTn id="32" fill="hold">
+                            <p:stCondLst>
+                              <p:cond delay="0"/>
+                            </p:stCondLst>
+                            <p:childTnLst>
+                              <p:par>
+                                <p:cTn id="33" presetID="42" presetClass="entr" presetSubtype="0" fill="hold" grpId="0" nodeType="clickEffect">
+                                  <p:stCondLst>
+                                    <p:cond delay="0"/>
+                                  </p:stCondLst>
+                                  <p:childTnLst>
+                                    <p:set>
+                                      <p:cBhvr>
+                                        <p:cTn id="34" dur="1" fill="hold">
+                                          <p:stCondLst>
+                                            <p:cond delay="0"/>
+                                          </p:stCondLst>
+                                        </p:cTn>
+                                        <p:tgtEl>
+                                          <p:spTgt spid="3">
+                                            <p:txEl>
+                                              <p:pRg st="4" end="4"/>
+                                            </p:txEl>
+                                          </p:spTgt>
+                                        </p:tgtEl>
+                                        <p:attrNameLst>
+                                          <p:attrName>style.visibility</p:attrName>
+                                        </p:attrNameLst>
+                                      </p:cBhvr>
+                                      <p:to>
+                                        <p:strVal val="visible"/>
+                                      </p:to>
+                                    </p:set>
+                                    <p:animEffect transition="in" filter="fade">
+                                      <p:cBhvr>
+                                        <p:cTn id="35" dur="500"/>
+                                        <p:tgtEl>
+                                          <p:spTgt spid="3">
+                                            <p:txEl>
+                                              <p:pRg st="4" end="4"/>
+                                            </p:txEl>
+                                          </p:spTgt>
+                                        </p:tgtEl>
+                                      </p:cBhvr>
+                                    </p:animEffect>
+                                    <p:anim calcmode="lin" valueType="num">
+                                      <p:cBhvr>
+                                        <p:cTn id="36" dur="500" fill="hold"/>
+                                        <p:tgtEl>
+                                          <p:spTgt spid="3">
+                                            <p:txEl>
+                                              <p:pRg st="4" end="4"/>
+                                            </p:txEl>
+                                          </p:spTgt>
+                                        </p:tgtEl>
+                                        <p:attrNameLst>
+                                          <p:attrName>ppt_x</p:attrName>
+                                        </p:attrNameLst>
+                                      </p:cBhvr>
+                                      <p:tavLst>
+                                        <p:tav tm="0">
+                                          <p:val>
+                                            <p:strVal val="#ppt_x"/>
+                                          </p:val>
+                                        </p:tav>
+                                        <p:tav tm="100000">
+                                          <p:val>
+                                            <p:strVal val="#ppt_x"/>
+                                          </p:val>
+                                        </p:tav>
+                                      </p:tavLst>
+                                    </p:anim>
+                                    <p:anim calcmode="lin" valueType="num">
+                                      <p:cBhvr>
+                                        <p:cTn id="37" dur="500" fill="hold"/>
+                                        <p:tgtEl>
+                                          <p:spTgt spid="3">
+                                            <p:txEl>
+                                              <p:pRg st="4" end="4"/>
+                                            </p:txEl>
+                                          </p:spTgt>
+                                        </p:tgtEl>
+                                        <p:attrNameLst>
+                                          <p:attrName>ppt_y</p:attrName>
+                                        </p:attrNameLst>
+                                      </p:cBhvr>
+                                      <p:tavLst>
+                                        <p:tav tm="0">
+                                          <p:val>
+                                            <p:strVal val="#ppt_y+.1"/>
+                                          </p:val>
+                                        </p:tav>
+                                        <p:tav tm="100000">
+                                          <p:val>
+                                            <p:strVal val="#ppt_y"/>
+                                          </p:val>
+                                        </p:tav>
+                                      </p:tavLst>
+                                    </p:anim>
+                                  </p:childTnLst>
+                                </p:cTn>
+                              </p:par>
+                            </p:childTnLst>
+                          </p:cTn>
+                        </p:par>
+                      </p:childTnLst>
+                    </p:cTn>
+                  </p:par>
+                  <p:par>
+                    <p:cTn id="38" fill="hold">
+                      <p:stCondLst>
+                        <p:cond delay="indefinite"/>
+                      </p:stCondLst>
+                      <p:childTnLst>
+                        <p:par>
+                          <p:cTn id="39" fill="hold">
+                            <p:stCondLst>
+                              <p:cond delay="0"/>
+                            </p:stCondLst>
+                            <p:childTnLst>
+                              <p:par>
+                                <p:cTn id="40" presetID="42" presetClass="entr" presetSubtype="0" fill="hold" grpId="0" nodeType="clickEffect">
+                                  <p:stCondLst>
+                                    <p:cond delay="0"/>
+                                  </p:stCondLst>
+                                  <p:childTnLst>
+                                    <p:set>
+                                      <p:cBhvr>
+                                        <p:cTn id="41" dur="1" fill="hold">
+                                          <p:stCondLst>
+                                            <p:cond delay="0"/>
+                                          </p:stCondLst>
+                                        </p:cTn>
+                                        <p:tgtEl>
+                                          <p:spTgt spid="3">
+                                            <p:txEl>
+                                              <p:pRg st="5" end="5"/>
+                                            </p:txEl>
+                                          </p:spTgt>
+                                        </p:tgtEl>
+                                        <p:attrNameLst>
+                                          <p:attrName>style.visibility</p:attrName>
+                                        </p:attrNameLst>
+                                      </p:cBhvr>
+                                      <p:to>
+                                        <p:strVal val="visible"/>
+                                      </p:to>
+                                    </p:set>
+                                    <p:animEffect transition="in" filter="fade">
+                                      <p:cBhvr>
+                                        <p:cTn id="42" dur="500"/>
+                                        <p:tgtEl>
+                                          <p:spTgt spid="3">
+                                            <p:txEl>
+                                              <p:pRg st="5" end="5"/>
+                                            </p:txEl>
+                                          </p:spTgt>
+                                        </p:tgtEl>
+                                      </p:cBhvr>
+                                    </p:animEffect>
+                                    <p:anim calcmode="lin" valueType="num">
+                                      <p:cBhvr>
+                                        <p:cTn id="43" dur="500" fill="hold"/>
+                                        <p:tgtEl>
+                                          <p:spTgt spid="3">
+                                            <p:txEl>
+                                              <p:pRg st="5" end="5"/>
+                                            </p:txEl>
+                                          </p:spTgt>
+                                        </p:tgtEl>
+                                        <p:attrNameLst>
+                                          <p:attrName>ppt_x</p:attrName>
+                                        </p:attrNameLst>
+                                      </p:cBhvr>
+                                      <p:tavLst>
+                                        <p:tav tm="0">
+                                          <p:val>
+                                            <p:strVal val="#ppt_x"/>
+                                          </p:val>
+                                        </p:tav>
+                                        <p:tav tm="100000">
+                                          <p:val>
+                                            <p:strVal val="#ppt_x"/>
+                                          </p:val>
+                                        </p:tav>
+                                      </p:tavLst>
+                                    </p:anim>
+                                    <p:anim calcmode="lin" valueType="num">
+                                      <p:cBhvr>
+                                        <p:cTn id="44" dur="500" fill="hold"/>
+                                        <p:tgtEl>
+                                          <p:spTgt spid="3">
+                                            <p:txEl>
+                                              <p:pRg st="5" end="5"/>
+                                            </p:txEl>
+                                          </p:spTgt>
+                                        </p:tgtEl>
+                                        <p:attrNameLst>
+                                          <p:attrName>ppt_y</p:attrName>
+                                        </p:attrNameLst>
+                                      </p:cBhvr>
+                                      <p:tavLst>
+                                        <p:tav tm="0">
+                                          <p:val>
+                                            <p:strVal val="#ppt_y+.1"/>
+                                          </p:val>
+                                        </p:tav>
+                                        <p:tav tm="100000">
+                                          <p:val>
+                                            <p:strVal val="#ppt_y"/>
+                                          </p:val>
+                                        </p:tav>
+                                      </p:tavLst>
+                                    </p:anim>
+                                  </p:childTnLst>
+                                </p:cTn>
+                              </p:par>
+                            </p:childTnLst>
+                          </p:cTn>
+                        </p:par>
+                      </p:childTnLst>
+                    </p:cTn>
+                  </p:par>
+                  <p:par>
+                    <p:cTn id="45" fill="hold">
+                      <p:stCondLst>
+                        <p:cond delay="indefinite"/>
+                      </p:stCondLst>
+                      <p:childTnLst>
+                        <p:par>
+                          <p:cTn id="46" fill="hold">
+                            <p:stCondLst>
+                              <p:cond delay="0"/>
+                            </p:stCondLst>
+                            <p:childTnLst>
+                              <p:par>
+                                <p:cTn id="47" presetID="42" presetClass="entr" presetSubtype="0" fill="hold" grpId="0" nodeType="clickEffect">
+                                  <p:stCondLst>
+                                    <p:cond delay="0"/>
+                                  </p:stCondLst>
+                                  <p:childTnLst>
+                                    <p:set>
+                                      <p:cBhvr>
+                                        <p:cTn id="48" dur="1" fill="hold">
+                                          <p:stCondLst>
+                                            <p:cond delay="0"/>
+                                          </p:stCondLst>
+                                        </p:cTn>
+                                        <p:tgtEl>
+                                          <p:spTgt spid="3">
+                                            <p:txEl>
+                                              <p:pRg st="6" end="6"/>
+                                            </p:txEl>
+                                          </p:spTgt>
+                                        </p:tgtEl>
+                                        <p:attrNameLst>
+                                          <p:attrName>style.visibility</p:attrName>
+                                        </p:attrNameLst>
+                                      </p:cBhvr>
+                                      <p:to>
+                                        <p:strVal val="visible"/>
+                                      </p:to>
+                                    </p:set>
+                                    <p:animEffect transition="in" filter="fade">
+                                      <p:cBhvr>
+                                        <p:cTn id="49" dur="500"/>
+                                        <p:tgtEl>
+                                          <p:spTgt spid="3">
+                                            <p:txEl>
+                                              <p:pRg st="6" end="6"/>
+                                            </p:txEl>
+                                          </p:spTgt>
+                                        </p:tgtEl>
+                                      </p:cBhvr>
+                                    </p:animEffect>
+                                    <p:anim calcmode="lin" valueType="num">
+                                      <p:cBhvr>
+                                        <p:cTn id="50" dur="500" fill="hold"/>
+                                        <p:tgtEl>
+                                          <p:spTgt spid="3">
+                                            <p:txEl>
+                                              <p:pRg st="6" end="6"/>
+                                            </p:txEl>
+                                          </p:spTgt>
+                                        </p:tgtEl>
+                                        <p:attrNameLst>
+                                          <p:attrName>ppt_x</p:attrName>
+                                        </p:attrNameLst>
+                                      </p:cBhvr>
+                                      <p:tavLst>
+                                        <p:tav tm="0">
+                                          <p:val>
+                                            <p:strVal val="#ppt_x"/>
+                                          </p:val>
+                                        </p:tav>
+                                        <p:tav tm="100000">
+                                          <p:val>
+                                            <p:strVal val="#ppt_x"/>
+                                          </p:val>
+                                        </p:tav>
+                                      </p:tavLst>
+                                    </p:anim>
+                                    <p:anim calcmode="lin" valueType="num">
+                                      <p:cBhvr>
+                                        <p:cTn id="51" dur="500" fill="hold"/>
+                                        <p:tgtEl>
+                                          <p:spTgt spid="3">
+                                            <p:txEl>
+                                              <p:pRg st="6" end="6"/>
+                                            </p:txEl>
+                                          </p:spTgt>
+                                        </p:tgtEl>
+                                        <p:attrNameLst>
+                                          <p:attrName>ppt_y</p:attrName>
+                                        </p:attrNameLst>
+                                      </p:cBhvr>
+                                      <p:tavLst>
+                                        <p:tav tm="0">
+                                          <p:val>
+                                            <p:strVal val="#ppt_y+.1"/>
+                                          </p:val>
+                                        </p:tav>
+                                        <p:tav tm="100000">
+                                          <p:val>
+                                            <p:strVal val="#ppt_y"/>
+                                          </p:val>
+                                        </p:tav>
+                                      </p:tavLst>
+                                    </p:anim>
+                                  </p:childTnLst>
+                                </p:cTn>
+                              </p:par>
+                            </p:childTnLst>
+                          </p:cTn>
+                        </p:par>
+                      </p:childTnLst>
+                    </p:cTn>
+                  </p:par>
+                  <p:par>
+                    <p:cTn id="52" fill="hold">
+                      <p:stCondLst>
+                        <p:cond delay="indefinite"/>
+                      </p:stCondLst>
+                      <p:childTnLst>
+                        <p:par>
+                          <p:cTn id="53" fill="hold">
+                            <p:stCondLst>
+                              <p:cond delay="0"/>
+                            </p:stCondLst>
+                            <p:childTnLst>
+                              <p:par>
+                                <p:cTn id="54" presetID="42" presetClass="entr" presetSubtype="0" fill="hold" grpId="0" nodeType="clickEffect">
+                                  <p:stCondLst>
+                                    <p:cond delay="0"/>
+                                  </p:stCondLst>
+                                  <p:childTnLst>
+                                    <p:set>
+                                      <p:cBhvr>
+                                        <p:cTn id="55" dur="1" fill="hold">
+                                          <p:stCondLst>
+                                            <p:cond delay="0"/>
+                                          </p:stCondLst>
+                                        </p:cTn>
+                                        <p:tgtEl>
+                                          <p:spTgt spid="3">
+                                            <p:txEl>
+                                              <p:pRg st="7" end="7"/>
+                                            </p:txEl>
+                                          </p:spTgt>
+                                        </p:tgtEl>
+                                        <p:attrNameLst>
+                                          <p:attrName>style.visibility</p:attrName>
+                                        </p:attrNameLst>
+                                      </p:cBhvr>
+                                      <p:to>
+                                        <p:strVal val="visible"/>
+                                      </p:to>
+                                    </p:set>
+                                    <p:animEffect transition="in" filter="fade">
+                                      <p:cBhvr>
+                                        <p:cTn id="56" dur="500"/>
+                                        <p:tgtEl>
+                                          <p:spTgt spid="3">
+                                            <p:txEl>
+                                              <p:pRg st="7" end="7"/>
+                                            </p:txEl>
+                                          </p:spTgt>
+                                        </p:tgtEl>
+                                      </p:cBhvr>
+                                    </p:animEffect>
+                                    <p:anim calcmode="lin" valueType="num">
+                                      <p:cBhvr>
+                                        <p:cTn id="57" dur="500" fill="hold"/>
+                                        <p:tgtEl>
+                                          <p:spTgt spid="3">
+                                            <p:txEl>
+                                              <p:pRg st="7" end="7"/>
+                                            </p:txEl>
+                                          </p:spTgt>
+                                        </p:tgtEl>
+                                        <p:attrNameLst>
+                                          <p:attrName>ppt_x</p:attrName>
+                                        </p:attrNameLst>
+                                      </p:cBhvr>
+                                      <p:tavLst>
+                                        <p:tav tm="0">
+                                          <p:val>
+                                            <p:strVal val="#ppt_x"/>
+                                          </p:val>
+                                        </p:tav>
+                                        <p:tav tm="100000">
+                                          <p:val>
+                                            <p:strVal val="#ppt_x"/>
+                                          </p:val>
+                                        </p:tav>
+                                      </p:tavLst>
+                                    </p:anim>
+                                    <p:anim calcmode="lin" valueType="num">
+                                      <p:cBhvr>
+                                        <p:cTn id="58" dur="500" fill="hold"/>
+                                        <p:tgtEl>
+                                          <p:spTgt spid="3">
+                                            <p:txEl>
+                                              <p:pRg st="7" end="7"/>
+                                            </p:txEl>
+                                          </p:spTgt>
+                                        </p:tgtEl>
+                                        <p:attrNameLst>
+                                          <p:attrName>ppt_y</p:attrName>
+                                        </p:attrNameLst>
+                                      </p:cBhvr>
+                                      <p:tavLst>
+                                        <p:tav tm="0">
+                                          <p:val>
+                                            <p:strVal val="#ppt_y+.1"/>
+                                          </p:val>
+                                        </p:tav>
+                                        <p:tav tm="100000">
+                                          <p:val>
+                                            <p:strVal val="#ppt_y"/>
+                                          </p:val>
+                                        </p:tav>
+                                      </p:tavLst>
+                                    </p:anim>
+                                  </p:childTnLst>
+                                </p:cTn>
+                              </p:par>
+                            </p:childTnLst>
+                          </p:cTn>
+                        </p:par>
+                      </p:childTnLst>
+                    </p:cTn>
+                  </p:par>
+                  <p:par>
+                    <p:cTn id="59" fill="hold">
+                      <p:stCondLst>
+                        <p:cond delay="indefinite"/>
+                      </p:stCondLst>
+                      <p:childTnLst>
+                        <p:par>
+                          <p:cTn id="60" fill="hold">
+                            <p:stCondLst>
+                              <p:cond delay="0"/>
+                            </p:stCondLst>
+                            <p:childTnLst>
+                              <p:par>
+                                <p:cTn id="61" presetID="42" presetClass="entr" presetSubtype="0" fill="hold" grpId="0" nodeType="clickEffect">
+                                  <p:stCondLst>
+                                    <p:cond delay="0"/>
+                                  </p:stCondLst>
+                                  <p:childTnLst>
+                                    <p:set>
+                                      <p:cBhvr>
+                                        <p:cTn id="62" dur="1" fill="hold">
+                                          <p:stCondLst>
+                                            <p:cond delay="0"/>
+                                          </p:stCondLst>
+                                        </p:cTn>
+                                        <p:tgtEl>
+                                          <p:spTgt spid="3">
+                                            <p:txEl>
+                                              <p:pRg st="8" end="8"/>
+                                            </p:txEl>
+                                          </p:spTgt>
+                                        </p:tgtEl>
+                                        <p:attrNameLst>
+                                          <p:attrName>style.visibility</p:attrName>
+                                        </p:attrNameLst>
+                                      </p:cBhvr>
+                                      <p:to>
+                                        <p:strVal val="visible"/>
+                                      </p:to>
+                                    </p:set>
+                                    <p:animEffect transition="in" filter="fade">
+                                      <p:cBhvr>
+                                        <p:cTn id="63" dur="500"/>
+                                        <p:tgtEl>
+                                          <p:spTgt spid="3">
+                                            <p:txEl>
+                                              <p:pRg st="8" end="8"/>
+                                            </p:txEl>
+                                          </p:spTgt>
+                                        </p:tgtEl>
+                                      </p:cBhvr>
+                                    </p:animEffect>
+                                    <p:anim calcmode="lin" valueType="num">
+                                      <p:cBhvr>
+                                        <p:cTn id="64" dur="500" fill="hold"/>
+                                        <p:tgtEl>
+                                          <p:spTgt spid="3">
+                                            <p:txEl>
+                                              <p:pRg st="8" end="8"/>
+                                            </p:txEl>
+                                          </p:spTgt>
+                                        </p:tgtEl>
+                                        <p:attrNameLst>
+                                          <p:attrName>ppt_x</p:attrName>
+                                        </p:attrNameLst>
+                                      </p:cBhvr>
+                                      <p:tavLst>
+                                        <p:tav tm="0">
+                                          <p:val>
+                                            <p:strVal val="#ppt_x"/>
+                                          </p:val>
+                                        </p:tav>
+                                        <p:tav tm="100000">
+                                          <p:val>
+                                            <p:strVal val="#ppt_x"/>
+                                          </p:val>
+                                        </p:tav>
+                                      </p:tavLst>
+                                    </p:anim>
+                                    <p:anim calcmode="lin" valueType="num">
+                                      <p:cBhvr>
+                                        <p:cTn id="65" dur="500" fill="hold"/>
+                                        <p:tgtEl>
+                                          <p:spTgt spid="3">
+                                            <p:txEl>
+                                              <p:pRg st="8" end="8"/>
+                                            </p:txEl>
+                                          </p:spTgt>
+                                        </p:tgtEl>
+                                        <p:attrNameLst>
+                                          <p:attrName>ppt_y</p:attrName>
+                                        </p:attrNameLst>
+                                      </p:cBhvr>
+                                      <p:tavLst>
+                                        <p:tav tm="0">
+                                          <p:val>
+                                            <p:strVal val="#ppt_y+.1"/>
+                                          </p:val>
+                                        </p:tav>
+                                        <p:tav tm="100000">
+                                          <p:val>
+                                            <p:strVal val="#ppt_y"/>
+                                          </p:val>
+                                        </p:tav>
+                                      </p:tavLst>
+                                    </p:anim>
+                                  </p:childTnLst>
+                                </p:cTn>
+                              </p:par>
+                            </p:childTnLst>
+                          </p:cTn>
+                        </p:par>
+                      </p:childTnLst>
+                    </p:cTn>
+                  </p:par>
+                </p:childTnLst>
+              </p:cTn>
+              <p:prevCondLst>
+                <p:cond evt="onPrev" delay="0">
+                  <p:tgtEl>
+                    <p:sldTgt/>
+                  </p:tgtEl>
+                </p:cond>
+              </p:prevCondLst>
+              <p:nextCondLst>
+                <p:cond evt="onNext" delay="0">
+                  <p:tgtEl>
+                    <p:sldTgt/>
+                  </p:tgtEl>
+                </p:cond>
+              </p:nextCondLst>
+            </p:seq>
+          </p:childTnLst>
+        </p:cTn>
+      </p:par>
+    </p:tnLst>
+    <p:bldLst>
+      <p:bldP spid="3" grpId="0" build="p"/>
+    </p:bldLst>
+  </p:timing>
+</p:sld>
+</file>
+
+<file path=ppt/slides/slide11.xml><?xml version="1.0" encoding="utf-8"?>
+<p:sld xmlns:a="http://schemas.openxmlformats.org/drawingml/2006/main" xmlns:r="http://schemas.openxmlformats.org/officeDocument/2006/relationships" xmlns:p="http://schemas.openxmlformats.org/presentationml/2006/main">
+  <p:cSld>
+    <p:spTree>
+      <p:nvGrpSpPr>
+        <p:cNvPr id="1" name=""/>
+        <p:cNvGrpSpPr/>
+        <p:nvPr/>
+      </p:nvGrpSpPr>
+      <p:grpSpPr>
+        <a:xfrm>
+          <a:off x="0" y="0"/>
+          <a:ext cx="0" cy="0"/>
+          <a:chOff x="0" y="0"/>
+          <a:chExt cx="0" cy="0"/>
+        </a:xfrm>
+      </p:grpSpPr>
+      <p:sp>
+        <p:nvSpPr>
+          <p:cNvPr id="6" name="직사각형 5"/>
+          <p:cNvSpPr/>
+          <p:nvPr/>
+        </p:nvSpPr>
+        <p:spPr>
+          <a:xfrm>
+            <a:off x="2826327" y="2738062"/>
+            <a:ext cx="3142211" cy="781395"/>
+          </a:xfrm>
+          <a:prstGeom prst="rect">
+            <a:avLst/>
+          </a:prstGeom>
+          <a:solidFill>
+            <a:schemeClr val="tx1"/>
+          </a:solidFill>
+          <a:ln>
+            <a:noFill/>
+          </a:ln>
+        </p:spPr>
+        <p:style>
+          <a:lnRef idx="2">
+            <a:schemeClr val="accent1">
+              <a:shade val="50000"/>
+            </a:schemeClr>
+          </a:lnRef>
+          <a:fillRef idx="1">
+            <a:schemeClr val="accent1"/>
+          </a:fillRef>
+          <a:effectRef idx="0">
+            <a:schemeClr val="accent1"/>
+          </a:effectRef>
+          <a:fontRef idx="minor">
+            <a:schemeClr val="lt1"/>
+          </a:fontRef>
+        </p:style>
+        <p:txBody>
+          <a:bodyPr rtlCol="0" anchor="ctr"/>
+          <a:lstStyle/>
+          <a:p>
+            <a:pPr algn="ctr"/>
+            <a:endParaRPr lang="ko-KR" altLang="en-US"/>
+          </a:p>
+        </p:txBody>
+      </p:sp>
+      <p:sp>
+        <p:nvSpPr>
+          <p:cNvPr id="2" name="제목 1"/>
+          <p:cNvSpPr>
+            <a:spLocks noGrp="1"/>
+          </p:cNvSpPr>
+          <p:nvPr>
+            <p:ph type="title"/>
+          </p:nvPr>
+        </p:nvSpPr>
+        <p:spPr>
+          <a:xfrm>
+            <a:off x="628650" y="2738062"/>
+            <a:ext cx="7886700" cy="1143056"/>
+          </a:xfrm>
+        </p:spPr>
+        <p:txBody>
+          <a:bodyPr>
+            <a:normAutofit/>
+          </a:bodyPr>
+          <a:lstStyle/>
+          <a:p>
+            <a:pPr algn="ctr"/>
+            <a:r>
+              <a:rPr lang="en-US" altLang="ko-KR" sz="3200" dirty="0" smtClean="0"/>
+              <a:t>Thank you!</a:t>
+            </a:r>
+            <a:endParaRPr lang="ko-KR" altLang="en-US" sz="3200" dirty="0"/>
+          </a:p>
+        </p:txBody>
+      </p:sp>
+      <p:sp>
+        <p:nvSpPr>
+          <p:cNvPr id="3" name="내용 개체 틀 2"/>
+          <p:cNvSpPr>
+            <a:spLocks noGrp="1"/>
+          </p:cNvSpPr>
+          <p:nvPr>
+            <p:ph idx="1"/>
+          </p:nvPr>
+        </p:nvSpPr>
+        <p:spPr>
+          <a:xfrm>
+            <a:off x="628650" y="3519457"/>
+            <a:ext cx="7886700" cy="2478174"/>
+          </a:xfrm>
+        </p:spPr>
+        <p:txBody>
+          <a:bodyPr>
+            <a:normAutofit/>
+          </a:bodyPr>
+          <a:lstStyle/>
+          <a:p>
+            <a:pPr marL="0" indent="0" algn="ctr">
+              <a:buNone/>
+            </a:pPr>
+            <a:r>
+              <a:rPr lang="en-US" altLang="ko-KR" dirty="0"/>
+              <a:t>A</a:t>
+            </a:r>
+            <a:r>
+              <a:rPr lang="en-US" altLang="ko-KR" dirty="0" smtClean="0"/>
+              <a:t>nd any questions?</a:t>
+            </a:r>
+          </a:p>
+        </p:txBody>
+      </p:sp>
+    </p:spTree>
+    <p:extLst>
+      <p:ext uri="{BB962C8B-B14F-4D97-AF65-F5344CB8AC3E}">
+        <p14:creationId xmlns:p14="http://schemas.microsoft.com/office/powerpoint/2010/main" val="882950775"/>
       </p:ext>
     </p:extLst>
   </p:cSld>
@@ -3549,35 +5270,6 @@
           <a:chExt cx="0" cy="0"/>
         </a:xfrm>
       </p:grpSpPr>
-      <p:pic>
-        <p:nvPicPr>
-          <p:cNvPr id="6" name="그림 5"/>
-          <p:cNvPicPr>
-            <a:picLocks noChangeAspect="1"/>
-          </p:cNvPicPr>
-          <p:nvPr/>
-        </p:nvPicPr>
-        <p:blipFill rotWithShape="1">
-          <a:blip r:embed="rId2">
-            <a:extLst>
-              <a:ext uri="{28A0092B-C50C-407E-A947-70E740481C1C}">
-                <a14:useLocalDpi xmlns:a14="http://schemas.microsoft.com/office/drawing/2010/main" val="0"/>
-              </a:ext>
-            </a:extLst>
-          </a:blip>
-          <a:srcRect t="17920" r="26640"/>
-          <a:stretch/>
-        </p:blipFill>
-        <p:spPr>
-          <a:xfrm>
-            <a:off x="2424612" y="-14514"/>
-            <a:ext cx="3555274" cy="5629048"/>
-          </a:xfrm>
-          <a:prstGeom prst="rect">
-            <a:avLst/>
-          </a:prstGeom>
-        </p:spPr>
-      </p:pic>
       <p:sp>
         <p:nvSpPr>
           <p:cNvPr id="2" name="제목 1"/>
@@ -3585,253 +5277,134 @@
             <a:spLocks noGrp="1"/>
           </p:cNvSpPr>
           <p:nvPr>
-            <p:ph type="ctrTitle"/>
-          </p:nvPr>
-        </p:nvSpPr>
-        <p:spPr>
-          <a:xfrm>
-            <a:off x="685800" y="2338933"/>
-            <a:ext cx="7772400" cy="2387600"/>
-          </a:xfrm>
-        </p:spPr>
-        <p:txBody>
-          <a:bodyPr>
-            <a:normAutofit/>
-          </a:bodyPr>
-          <a:lstStyle/>
-          <a:p>
-            <a:r>
-              <a:rPr lang="en-US" altLang="ko-KR" sz="11500" dirty="0" smtClean="0">
+            <p:ph type="title"/>
+          </p:nvPr>
+        </p:nvSpPr>
+        <p:spPr/>
+        <p:txBody>
+          <a:bodyPr/>
+          <a:lstStyle/>
+          <a:p>
+            <a:r>
+              <a:rPr lang="en-US" altLang="ko-KR" dirty="0" smtClean="0"/>
+              <a:t>Story</a:t>
+            </a:r>
+            <a:endParaRPr lang="ko-KR" altLang="en-US" dirty="0"/>
+          </a:p>
+        </p:txBody>
+      </p:sp>
+      <p:sp>
+        <p:nvSpPr>
+          <p:cNvPr id="3" name="내용 개체 틀 2"/>
+          <p:cNvSpPr>
+            <a:spLocks noGrp="1"/>
+          </p:cNvSpPr>
+          <p:nvPr>
+            <p:ph idx="1"/>
+          </p:nvPr>
+        </p:nvSpPr>
+        <p:spPr/>
+        <p:txBody>
+          <a:bodyPr/>
+          <a:lstStyle/>
+          <a:p>
+            <a:pPr marL="0" indent="0">
+              <a:buNone/>
+            </a:pPr>
+            <a:r>
+              <a:rPr lang="en-US" altLang="ko-KR" sz="2000" dirty="0" smtClean="0">
                 <a:solidFill>
                   <a:schemeClr val="bg1"/>
                 </a:solidFill>
-                <a:latin typeface="SketchFlow Print" panose="02000000000000000000" pitchFamily="2" charset="0"/>
               </a:rPr>
               <a:t>D</a:t>
             </a:r>
-            <a:endParaRPr lang="ko-KR" altLang="en-US" sz="11500" dirty="0">
+            <a:r>
+              <a:rPr lang="ko-KR" altLang="en-US" sz="2000" dirty="0" smtClean="0">
+                <a:solidFill>
+                  <a:schemeClr val="bg1"/>
+                </a:solidFill>
+              </a:rPr>
+              <a:t>의 친구 </a:t>
+            </a:r>
+            <a:r>
+              <a:rPr lang="en-US" altLang="ko-KR" sz="2000" dirty="0" smtClean="0">
+                <a:solidFill>
+                  <a:schemeClr val="bg1"/>
+                </a:solidFill>
+              </a:rPr>
+              <a:t>I</a:t>
+            </a:r>
+            <a:r>
+              <a:rPr lang="ko-KR" altLang="en-US" sz="2000" dirty="0" smtClean="0">
+                <a:solidFill>
+                  <a:schemeClr val="bg1"/>
+                </a:solidFill>
+              </a:rPr>
+              <a:t>는</a:t>
+            </a:r>
+            <a:r>
+              <a:rPr lang="en-US" altLang="ko-KR" sz="2000" dirty="0" smtClean="0">
+                <a:solidFill>
+                  <a:schemeClr val="bg1"/>
+                </a:solidFill>
+              </a:rPr>
+              <a:t> Catcher</a:t>
+            </a:r>
+            <a:r>
+              <a:rPr lang="ko-KR" altLang="en-US" sz="2000" dirty="0" smtClean="0">
+                <a:solidFill>
+                  <a:schemeClr val="bg1"/>
+                </a:solidFill>
+              </a:rPr>
+              <a:t>의 도움을 받아</a:t>
+            </a:r>
+            <a:endParaRPr lang="en-US" altLang="ko-KR" sz="2000" dirty="0" smtClean="0">
               <a:solidFill>
                 <a:schemeClr val="bg1"/>
               </a:solidFill>
-              <a:latin typeface="SketchFlow Print" panose="02000000000000000000" pitchFamily="2" charset="0"/>
             </a:endParaRPr>
           </a:p>
-        </p:txBody>
-      </p:sp>
-      <p:sp>
-        <p:nvSpPr>
-          <p:cNvPr id="7" name="부제목 2"/>
-          <p:cNvSpPr txBox="1">
-            <a:spLocks/>
-          </p:cNvSpPr>
-          <p:nvPr/>
-        </p:nvSpPr>
-        <p:spPr>
-          <a:xfrm>
-            <a:off x="1143000" y="4838360"/>
-            <a:ext cx="6858000" cy="1552347"/>
-          </a:xfrm>
-          <a:prstGeom prst="rect">
-            <a:avLst/>
-          </a:prstGeom>
-        </p:spPr>
-        <p:txBody>
-          <a:bodyPr vert="horz" lIns="91440" tIns="45720" rIns="91440" bIns="45720" rtlCol="0">
-            <a:noAutofit/>
-          </a:bodyPr>
-          <a:lstStyle>
-            <a:lvl1pPr marL="0" indent="0" algn="ctr" defTabSz="914400" rtl="0" eaLnBrk="1" latinLnBrk="1" hangingPunct="1">
-              <a:lnSpc>
-                <a:spcPct val="90000"/>
-              </a:lnSpc>
-              <a:spcBef>
-                <a:spcPts val="1000"/>
-              </a:spcBef>
-              <a:buFont typeface="Arial" panose="020B0604020202020204" pitchFamily="34" charset="0"/>
-              <a:buNone/>
-              <a:defRPr sz="2400" kern="1200">
-                <a:solidFill>
-                  <a:schemeClr val="tx1"/>
-                </a:solidFill>
-                <a:latin typeface="+mn-lt"/>
-                <a:ea typeface="+mn-ea"/>
-                <a:cs typeface="+mn-cs"/>
-              </a:defRPr>
-            </a:lvl1pPr>
-            <a:lvl2pPr marL="457200" indent="0" algn="ctr" defTabSz="914400" rtl="0" eaLnBrk="1" latinLnBrk="1" hangingPunct="1">
-              <a:lnSpc>
-                <a:spcPct val="90000"/>
-              </a:lnSpc>
-              <a:spcBef>
-                <a:spcPts val="500"/>
-              </a:spcBef>
-              <a:buFont typeface="Arial" panose="020B0604020202020204" pitchFamily="34" charset="0"/>
-              <a:buNone/>
-              <a:defRPr sz="2000" kern="1200">
-                <a:solidFill>
-                  <a:schemeClr val="tx1"/>
-                </a:solidFill>
-                <a:latin typeface="+mn-lt"/>
-                <a:ea typeface="+mn-ea"/>
-                <a:cs typeface="+mn-cs"/>
-              </a:defRPr>
-            </a:lvl2pPr>
-            <a:lvl3pPr marL="914400" indent="0" algn="ctr" defTabSz="914400" rtl="0" eaLnBrk="1" latinLnBrk="1" hangingPunct="1">
-              <a:lnSpc>
-                <a:spcPct val="90000"/>
-              </a:lnSpc>
-              <a:spcBef>
-                <a:spcPts val="500"/>
-              </a:spcBef>
-              <a:buFont typeface="Arial" panose="020B0604020202020204" pitchFamily="34" charset="0"/>
-              <a:buNone/>
-              <a:defRPr sz="1800" kern="1200">
-                <a:solidFill>
-                  <a:schemeClr val="tx1"/>
-                </a:solidFill>
-                <a:latin typeface="+mn-lt"/>
-                <a:ea typeface="+mn-ea"/>
-                <a:cs typeface="+mn-cs"/>
-              </a:defRPr>
-            </a:lvl3pPr>
-            <a:lvl4pPr marL="1371600" indent="0" algn="ctr" defTabSz="914400" rtl="0" eaLnBrk="1" latinLnBrk="1" hangingPunct="1">
-              <a:lnSpc>
-                <a:spcPct val="90000"/>
-              </a:lnSpc>
-              <a:spcBef>
-                <a:spcPts val="500"/>
-              </a:spcBef>
-              <a:buFont typeface="Arial" panose="020B0604020202020204" pitchFamily="34" charset="0"/>
-              <a:buNone/>
-              <a:defRPr sz="1600" kern="1200">
-                <a:solidFill>
-                  <a:schemeClr val="tx1"/>
-                </a:solidFill>
-                <a:latin typeface="+mn-lt"/>
-                <a:ea typeface="+mn-ea"/>
-                <a:cs typeface="+mn-cs"/>
-              </a:defRPr>
-            </a:lvl4pPr>
-            <a:lvl5pPr marL="1828800" indent="0" algn="ctr" defTabSz="914400" rtl="0" eaLnBrk="1" latinLnBrk="1" hangingPunct="1">
-              <a:lnSpc>
-                <a:spcPct val="90000"/>
-              </a:lnSpc>
-              <a:spcBef>
-                <a:spcPts val="500"/>
-              </a:spcBef>
-              <a:buFont typeface="Arial" panose="020B0604020202020204" pitchFamily="34" charset="0"/>
-              <a:buNone/>
-              <a:defRPr sz="1600" kern="1200">
-                <a:solidFill>
-                  <a:schemeClr val="tx1"/>
-                </a:solidFill>
-                <a:latin typeface="+mn-lt"/>
-                <a:ea typeface="+mn-ea"/>
-                <a:cs typeface="+mn-cs"/>
-              </a:defRPr>
-            </a:lvl5pPr>
-            <a:lvl6pPr marL="2286000" indent="0" algn="ctr" defTabSz="914400" rtl="0" eaLnBrk="1" latinLnBrk="1" hangingPunct="1">
-              <a:lnSpc>
-                <a:spcPct val="90000"/>
-              </a:lnSpc>
-              <a:spcBef>
-                <a:spcPts val="500"/>
-              </a:spcBef>
-              <a:buFont typeface="Arial" panose="020B0604020202020204" pitchFamily="34" charset="0"/>
-              <a:buNone/>
-              <a:defRPr sz="1600" kern="1200">
-                <a:solidFill>
-                  <a:schemeClr val="tx1"/>
-                </a:solidFill>
-                <a:latin typeface="+mn-lt"/>
-                <a:ea typeface="+mn-ea"/>
-                <a:cs typeface="+mn-cs"/>
-              </a:defRPr>
-            </a:lvl6pPr>
-            <a:lvl7pPr marL="2743200" indent="0" algn="ctr" defTabSz="914400" rtl="0" eaLnBrk="1" latinLnBrk="1" hangingPunct="1">
-              <a:lnSpc>
-                <a:spcPct val="90000"/>
-              </a:lnSpc>
-              <a:spcBef>
-                <a:spcPts val="500"/>
-              </a:spcBef>
-              <a:buFont typeface="Arial" panose="020B0604020202020204" pitchFamily="34" charset="0"/>
-              <a:buNone/>
-              <a:defRPr sz="1600" kern="1200">
-                <a:solidFill>
-                  <a:schemeClr val="tx1"/>
-                </a:solidFill>
-                <a:latin typeface="+mn-lt"/>
-                <a:ea typeface="+mn-ea"/>
-                <a:cs typeface="+mn-cs"/>
-              </a:defRPr>
-            </a:lvl7pPr>
-            <a:lvl8pPr marL="3200400" indent="0" algn="ctr" defTabSz="914400" rtl="0" eaLnBrk="1" latinLnBrk="1" hangingPunct="1">
-              <a:lnSpc>
-                <a:spcPct val="90000"/>
-              </a:lnSpc>
-              <a:spcBef>
-                <a:spcPts val="500"/>
-              </a:spcBef>
-              <a:buFont typeface="Arial" panose="020B0604020202020204" pitchFamily="34" charset="0"/>
-              <a:buNone/>
-              <a:defRPr sz="1600" kern="1200">
-                <a:solidFill>
-                  <a:schemeClr val="tx1"/>
-                </a:solidFill>
-                <a:latin typeface="+mn-lt"/>
-                <a:ea typeface="+mn-ea"/>
-                <a:cs typeface="+mn-cs"/>
-              </a:defRPr>
-            </a:lvl8pPr>
-            <a:lvl9pPr marL="3657600" indent="0" algn="ctr" defTabSz="914400" rtl="0" eaLnBrk="1" latinLnBrk="1" hangingPunct="1">
-              <a:lnSpc>
-                <a:spcPct val="90000"/>
-              </a:lnSpc>
-              <a:spcBef>
-                <a:spcPts val="500"/>
-              </a:spcBef>
-              <a:buFont typeface="Arial" panose="020B0604020202020204" pitchFamily="34" charset="0"/>
-              <a:buNone/>
-              <a:defRPr sz="1600" kern="1200">
-                <a:solidFill>
-                  <a:schemeClr val="tx1"/>
-                </a:solidFill>
-                <a:latin typeface="+mn-lt"/>
-                <a:ea typeface="+mn-ea"/>
-                <a:cs typeface="+mn-cs"/>
-              </a:defRPr>
-            </a:lvl9pPr>
-          </a:lstStyle>
-          <a:p>
-            <a:r>
-              <a:rPr lang="en-US" altLang="ko-KR" sz="3200" dirty="0" smtClean="0">
+          <a:p>
+            <a:pPr marL="0" indent="0">
+              <a:buNone/>
+            </a:pPr>
+            <a:r>
+              <a:rPr lang="ko-KR" altLang="en-US" sz="2400" dirty="0" smtClean="0">
                 <a:solidFill>
                   <a:schemeClr val="bg1"/>
                 </a:solidFill>
-                <a:latin typeface="SketchFlow Print" panose="02000000000000000000" pitchFamily="2" charset="0"/>
-                <a:cs typeface="Sakkal Majalla" panose="02000000000000000000" pitchFamily="2" charset="-78"/>
               </a:rPr>
-              <a:t>Line Plus X CATDOG</a:t>
-            </a:r>
-          </a:p>
-          <a:p>
-            <a:r>
-              <a:rPr lang="en-US" altLang="ko-KR" sz="1800" dirty="0" smtClean="0">
+              <a:t>식물인간이 된 </a:t>
+            </a:r>
+            <a:r>
+              <a:rPr lang="en-US" altLang="ko-KR" sz="2400" dirty="0" smtClean="0">
                 <a:solidFill>
                   <a:schemeClr val="bg1"/>
                 </a:solidFill>
-                <a:latin typeface="SketchFlow Print" panose="02000000000000000000" pitchFamily="2" charset="0"/>
-                <a:cs typeface="Sakkal Majalla" panose="02000000000000000000" pitchFamily="2" charset="-78"/>
               </a:rPr>
-              <a:t>2D Mobile Adventure Game</a:t>
-            </a:r>
-            <a:endParaRPr lang="en-US" altLang="ko-KR" sz="1800" dirty="0" smtClean="0">
+              <a:t>D</a:t>
+            </a:r>
+            <a:r>
+              <a:rPr lang="ko-KR" altLang="en-US" sz="2400" dirty="0" smtClean="0">
+                <a:solidFill>
+                  <a:schemeClr val="bg1"/>
+                </a:solidFill>
+              </a:rPr>
+              <a:t>를 깨운다</a:t>
+            </a:r>
+            <a:r>
+              <a:rPr lang="en-US" altLang="ko-KR" sz="2400" dirty="0">
+                <a:solidFill>
+                  <a:schemeClr val="bg1"/>
+                </a:solidFill>
+              </a:rPr>
+              <a:t>.</a:t>
+            </a:r>
+            <a:endParaRPr lang="en-US" altLang="ko-KR" sz="2400" dirty="0" smtClean="0">
               <a:solidFill>
                 <a:schemeClr val="bg1"/>
               </a:solidFill>
-              <a:latin typeface="SketchFlow Print" panose="02000000000000000000" pitchFamily="2" charset="0"/>
-              <a:cs typeface="Sakkal Majalla" panose="02000000000000000000" pitchFamily="2" charset="-78"/>
             </a:endParaRPr>
           </a:p>
         </p:txBody>
@@ -3839,7 +5412,7 @@
     </p:spTree>
     <p:extLst>
       <p:ext uri="{BB962C8B-B14F-4D97-AF65-F5344CB8AC3E}">
-        <p14:creationId xmlns:p14="http://schemas.microsoft.com/office/powerpoint/2010/main" val="381047478"/>
+        <p14:creationId xmlns:p14="http://schemas.microsoft.com/office/powerpoint/2010/main" val="2111501978"/>
       </p:ext>
     </p:extLst>
   </p:cSld>
@@ -3943,7 +5516,7 @@
     </p:spTree>
     <p:extLst>
       <p:ext uri="{BB962C8B-B14F-4D97-AF65-F5344CB8AC3E}">
-        <p14:creationId xmlns:p14="http://schemas.microsoft.com/office/powerpoint/2010/main" val="3300658109"/>
+        <p14:creationId xmlns:p14="http://schemas.microsoft.com/office/powerpoint/2010/main" val="1060079354"/>
       </p:ext>
     </p:extLst>
   </p:cSld>
@@ -4040,11 +5613,7 @@
             </a:pPr>
             <a:r>
               <a:rPr lang="ko-KR" altLang="en-US" dirty="0" smtClean="0"/>
-              <a:t>단순 </a:t>
-            </a:r>
-            <a:r>
-              <a:rPr lang="ko-KR" altLang="en-US" dirty="0" smtClean="0"/>
-              <a:t>반복 </a:t>
+              <a:t>단순 반복 </a:t>
             </a:r>
             <a:r>
               <a:rPr lang="en-US" altLang="ko-KR" dirty="0" smtClean="0"/>
@@ -4057,31 +5626,23 @@
             </a:pPr>
             <a:r>
               <a:rPr lang="en-US" altLang="ko-KR" dirty="0" smtClean="0"/>
-              <a:t>Goal</a:t>
+              <a:t>Game </a:t>
             </a:r>
             <a:r>
               <a:rPr lang="ko-KR" altLang="en-US" dirty="0" smtClean="0"/>
-              <a:t> </a:t>
-            </a:r>
-            <a:r>
-              <a:rPr lang="en-US" altLang="ko-KR" dirty="0"/>
-              <a:t>: </a:t>
-            </a:r>
-            <a:r>
-              <a:rPr lang="ko-KR" altLang="en-US" dirty="0"/>
-              <a:t>화폐 </a:t>
-            </a:r>
+              <a:t>내부에서 화폐를 모으고</a:t>
+            </a:r>
+            <a:endParaRPr lang="en-US" altLang="ko-KR" dirty="0" smtClean="0"/>
+          </a:p>
+          <a:p>
+            <a:pPr marL="0" indent="0" algn="ctr">
+              <a:buNone/>
+            </a:pPr>
             <a:r>
               <a:rPr lang="ko-KR" altLang="en-US" dirty="0" smtClean="0"/>
-              <a:t>수집 및 해금</a:t>
-            </a:r>
-            <a:endParaRPr lang="en-US" altLang="ko-KR" dirty="0"/>
-          </a:p>
-          <a:p>
-            <a:pPr marL="0" indent="0" algn="ctr">
-              <a:buNone/>
-            </a:pPr>
-            <a:endParaRPr lang="ko-KR" altLang="en-US" dirty="0"/>
+              <a:t>다른 메뉴에서 화폐를 사용</a:t>
+            </a:r>
+            <a:endParaRPr lang="en-US" altLang="ko-KR" dirty="0" smtClean="0"/>
           </a:p>
         </p:txBody>
       </p:sp>
@@ -4186,7 +5747,11 @@
             </a:pPr>
             <a:r>
               <a:rPr lang="ko-KR" altLang="en-US" dirty="0" smtClean="0"/>
-              <a:t>원형 미로 모양 </a:t>
+              <a:t>원형 </a:t>
+            </a:r>
+            <a:r>
+              <a:rPr lang="ko-KR" altLang="en-US" dirty="0" smtClean="0"/>
+              <a:t>미로 모양 </a:t>
             </a:r>
             <a:r>
               <a:rPr lang="en-US" altLang="ko-KR" dirty="0" smtClean="0"/>
@@ -4224,42 +5789,16 @@
             <a:endParaRPr lang="en-US" altLang="ko-KR" dirty="0" smtClean="0"/>
           </a:p>
           <a:p>
-            <a:pPr marL="0" indent="0">
+            <a:pPr marL="0" indent="0" algn="ctr">
               <a:buNone/>
             </a:pPr>
             <a:r>
-              <a:rPr lang="en-US" altLang="ko-KR" dirty="0"/>
-              <a:t>Game </a:t>
-            </a:r>
-            <a:r>
-              <a:rPr lang="ko-KR" altLang="en-US" dirty="0"/>
-              <a:t>종료 </a:t>
-            </a:r>
-            <a:r>
-              <a:rPr lang="en-US" altLang="ko-KR" dirty="0"/>
-              <a:t>: </a:t>
-            </a:r>
-            <a:r>
-              <a:rPr lang="ko-KR" altLang="en-US" dirty="0"/>
-              <a:t>제한시간</a:t>
-            </a:r>
-            <a:r>
-              <a:rPr lang="en-US" altLang="ko-KR" dirty="0"/>
-              <a:t>, </a:t>
-            </a:r>
-            <a:r>
               <a:rPr lang="ko-KR" altLang="en-US" dirty="0" smtClean="0"/>
-              <a:t>적</a:t>
-            </a:r>
-            <a:endParaRPr lang="en-US" altLang="ko-KR" dirty="0" smtClean="0"/>
-          </a:p>
-          <a:p>
-            <a:pPr marL="0" indent="0" algn="ctr">
-              <a:buNone/>
-            </a:pPr>
+              <a:t>특정 </a:t>
+            </a:r>
             <a:r>
               <a:rPr lang="ko-KR" altLang="en-US" dirty="0" smtClean="0"/>
-              <a:t>특정 조건 만족 시 전체 </a:t>
+              <a:t>조건 만족 시 전체 </a:t>
             </a:r>
             <a:r>
               <a:rPr lang="en-US" altLang="ko-KR" dirty="0" smtClean="0"/>
@@ -4267,11 +5806,7 @@
             </a:r>
             <a:r>
               <a:rPr lang="ko-KR" altLang="en-US" dirty="0" smtClean="0"/>
-              <a:t>이 </a:t>
-            </a:r>
-            <a:r>
-              <a:rPr lang="ko-KR" altLang="en-US" dirty="0" smtClean="0"/>
-              <a:t>넓어짐</a:t>
+              <a:t>이 넓어짐</a:t>
             </a:r>
             <a:endParaRPr lang="en-US" altLang="ko-KR" dirty="0" smtClean="0"/>
           </a:p>
@@ -4293,13 +5828,13 @@
               </a:ext>
             </a:extLst>
           </a:blip>
-          <a:srcRect l="23267" r="22900"/>
+          <a:srcRect l="22814" r="22003"/>
           <a:stretch/>
         </p:blipFill>
         <p:spPr bwMode="auto">
           <a:xfrm>
-            <a:off x="6351" y="0"/>
-            <a:ext cx="3746500" cy="6858000"/>
+            <a:off x="6350" y="0"/>
+            <a:ext cx="3840435" cy="6858000"/>
           </a:xfrm>
           <a:prstGeom prst="rect">
             <a:avLst/>
@@ -4329,6 +5864,58 @@
           </a:extLst>
         </p:spPr>
       </p:pic>
+      <p:sp>
+        <p:nvSpPr>
+          <p:cNvPr id="5" name="직사각형 4"/>
+          <p:cNvSpPr/>
+          <p:nvPr/>
+        </p:nvSpPr>
+        <p:spPr>
+          <a:xfrm>
+            <a:off x="0" y="3132785"/>
+            <a:ext cx="3862552" cy="592429"/>
+          </a:xfrm>
+          <a:prstGeom prst="rect">
+            <a:avLst/>
+          </a:prstGeom>
+          <a:solidFill>
+            <a:schemeClr val="tx1">
+              <a:alpha val="81000"/>
+            </a:schemeClr>
+          </a:solidFill>
+          <a:ln>
+            <a:noFill/>
+          </a:ln>
+        </p:spPr>
+        <p:style>
+          <a:lnRef idx="2">
+            <a:schemeClr val="accent1">
+              <a:shade val="50000"/>
+            </a:schemeClr>
+          </a:lnRef>
+          <a:fillRef idx="1">
+            <a:schemeClr val="accent1"/>
+          </a:fillRef>
+          <a:effectRef idx="0">
+            <a:schemeClr val="accent1"/>
+          </a:effectRef>
+          <a:fontRef idx="minor">
+            <a:schemeClr val="lt1"/>
+          </a:fontRef>
+        </p:style>
+        <p:txBody>
+          <a:bodyPr rtlCol="0" anchor="ctr"/>
+          <a:lstStyle/>
+          <a:p>
+            <a:pPr algn="ctr"/>
+            <a:r>
+              <a:rPr lang="en-US" altLang="ko-KR" dirty="0" smtClean="0"/>
+              <a:t>Concept Art</a:t>
+            </a:r>
+            <a:endParaRPr lang="ko-KR" altLang="en-US" dirty="0"/>
+          </a:p>
+        </p:txBody>
+      </p:sp>
     </p:spTree>
     <p:extLst>
       <p:ext uri="{BB962C8B-B14F-4D97-AF65-F5344CB8AC3E}">
@@ -4402,7 +5989,7 @@
             </a:br>
             <a:r>
               <a:rPr lang="en-US" altLang="ko-KR" dirty="0" smtClean="0"/>
-              <a:t>3) Unlock</a:t>
+              <a:t>2) Map</a:t>
             </a:r>
             <a:endParaRPr lang="ko-KR" altLang="en-US" dirty="0"/>
           </a:p>
@@ -4420,7 +6007,9 @@
         </p:nvSpPr>
         <p:spPr/>
         <p:txBody>
-          <a:bodyPr/>
+          <a:bodyPr>
+            <a:normAutofit/>
+          </a:bodyPr>
           <a:lstStyle/>
           <a:p>
             <a:pPr marL="0" indent="0" algn="ctr">
@@ -4428,15 +6017,40 @@
             </a:pPr>
             <a:r>
               <a:rPr lang="ko-KR" altLang="en-US" dirty="0" smtClean="0"/>
-              <a:t>화폐를 사용하여 </a:t>
+              <a:t>원형 미로 모양 </a:t>
             </a:r>
             <a:r>
               <a:rPr lang="en-US" altLang="ko-KR" dirty="0" smtClean="0"/>
-              <a:t>Unlock </a:t>
-            </a:r>
+              <a:t>Map</a:t>
+            </a:r>
+          </a:p>
+          <a:p>
+            <a:pPr marL="0" indent="0" algn="ctr">
+              <a:buNone/>
+            </a:pPr>
             <a:r>
               <a:rPr lang="ko-KR" altLang="en-US" dirty="0" smtClean="0"/>
-              <a:t>가능</a:t>
+              <a:t>시작 지점에 </a:t>
+            </a:r>
+            <a:r>
+              <a:rPr lang="en-US" altLang="ko-KR" dirty="0" smtClean="0"/>
+              <a:t>Mini</a:t>
+            </a:r>
+            <a:r>
+              <a:rPr lang="ko-KR" altLang="en-US" dirty="0" smtClean="0"/>
+              <a:t> </a:t>
+            </a:r>
+            <a:r>
+              <a:rPr lang="en-US" altLang="ko-KR" dirty="0"/>
+              <a:t>Map</a:t>
+            </a:r>
+            <a:r>
+              <a:rPr lang="en-US" altLang="ko-KR" dirty="0" smtClean="0"/>
+              <a:t> </a:t>
+            </a:r>
+            <a:r>
+              <a:rPr lang="ko-KR" altLang="en-US" dirty="0" smtClean="0"/>
+              <a:t>표시</a:t>
             </a:r>
             <a:endParaRPr lang="en-US" altLang="ko-KR" dirty="0" smtClean="0"/>
           </a:p>
@@ -4445,43 +6059,20 @@
               <a:buNone/>
             </a:pPr>
             <a:r>
+              <a:rPr lang="ko-KR" altLang="en-US" dirty="0" smtClean="0"/>
+              <a:t>특정 </a:t>
+            </a:r>
+            <a:r>
+              <a:rPr lang="ko-KR" altLang="en-US" dirty="0" smtClean="0"/>
+              <a:t>조건 만족 시 전체 </a:t>
+            </a:r>
+            <a:r>
               <a:rPr lang="en-US" altLang="ko-KR" dirty="0" smtClean="0"/>
-              <a:t>Story</a:t>
-            </a:r>
-            <a:r>
-              <a:rPr lang="ko-KR" altLang="en-US" dirty="0"/>
-              <a:t> </a:t>
-            </a:r>
-            <a:r>
-              <a:rPr lang="en-US" altLang="ko-KR" dirty="0" smtClean="0"/>
-              <a:t>Unlock / Field Unlock</a:t>
-            </a:r>
-          </a:p>
-          <a:p>
-            <a:pPr marL="0" indent="0" algn="ctr">
-              <a:buNone/>
-            </a:pPr>
+              <a:t>Map</a:t>
+            </a:r>
             <a:r>
               <a:rPr lang="ko-KR" altLang="en-US" dirty="0" smtClean="0"/>
-              <a:t>게임 내 생존시간 증가</a:t>
-            </a:r>
-            <a:endParaRPr lang="en-US" altLang="ko-KR" dirty="0" smtClean="0"/>
-          </a:p>
-          <a:p>
-            <a:pPr marL="0" indent="0" algn="ctr">
-              <a:buNone/>
-            </a:pPr>
-            <a:r>
-              <a:rPr lang="ko-KR" altLang="en-US" dirty="0" smtClean="0"/>
-              <a:t>이동 가능한 </a:t>
-            </a:r>
-            <a:r>
-              <a:rPr lang="en-US" altLang="ko-KR" smtClean="0"/>
-              <a:t>Map </a:t>
-            </a:r>
-            <a:r>
-              <a:rPr lang="ko-KR" altLang="en-US" smtClean="0"/>
-              <a:t>범위 확대</a:t>
+              <a:t>이 넓어짐</a:t>
             </a:r>
             <a:endParaRPr lang="en-US" altLang="ko-KR" dirty="0" smtClean="0"/>
           </a:p>
@@ -4490,7 +6081,7 @@
     </p:spTree>
     <p:extLst>
       <p:ext uri="{BB962C8B-B14F-4D97-AF65-F5344CB8AC3E}">
-        <p14:creationId xmlns:p14="http://schemas.microsoft.com/office/powerpoint/2010/main" val="1761270093"/>
+        <p14:creationId xmlns:p14="http://schemas.microsoft.com/office/powerpoint/2010/main" val="1718571819"/>
       </p:ext>
     </p:extLst>
   </p:cSld>
@@ -4526,52 +6117,6 @@
       </p:grpSpPr>
       <p:sp>
         <p:nvSpPr>
-          <p:cNvPr id="6" name="직사각형 5"/>
-          <p:cNvSpPr/>
-          <p:nvPr/>
-        </p:nvSpPr>
-        <p:spPr>
-          <a:xfrm>
-            <a:off x="2826327" y="2738062"/>
-            <a:ext cx="3142211" cy="781395"/>
-          </a:xfrm>
-          <a:prstGeom prst="rect">
-            <a:avLst/>
-          </a:prstGeom>
-          <a:solidFill>
-            <a:schemeClr val="tx1"/>
-          </a:solidFill>
-          <a:ln>
-            <a:noFill/>
-          </a:ln>
-        </p:spPr>
-        <p:style>
-          <a:lnRef idx="2">
-            <a:schemeClr val="accent1">
-              <a:shade val="50000"/>
-            </a:schemeClr>
-          </a:lnRef>
-          <a:fillRef idx="1">
-            <a:schemeClr val="accent1"/>
-          </a:fillRef>
-          <a:effectRef idx="0">
-            <a:schemeClr val="accent1"/>
-          </a:effectRef>
-          <a:fontRef idx="minor">
-            <a:schemeClr val="lt1"/>
-          </a:fontRef>
-        </p:style>
-        <p:txBody>
-          <a:bodyPr rtlCol="0" anchor="ctr"/>
-          <a:lstStyle/>
-          <a:p>
-            <a:pPr algn="ctr"/>
-            <a:endParaRPr lang="ko-KR" altLang="en-US"/>
-          </a:p>
-        </p:txBody>
-      </p:sp>
-      <p:sp>
-        <p:nvSpPr>
           <p:cNvPr id="2" name="제목 1"/>
           <p:cNvSpPr>
             <a:spLocks noGrp="1"/>
@@ -4580,22 +6125,33 @@
             <p:ph type="title"/>
           </p:nvPr>
         </p:nvSpPr>
-        <p:spPr>
-          <a:xfrm>
-            <a:off x="628650" y="2373226"/>
-            <a:ext cx="7886700" cy="1143056"/>
-          </a:xfrm>
-        </p:spPr>
+        <p:spPr/>
         <p:txBody>
           <a:bodyPr>
             <a:normAutofit/>
           </a:bodyPr>
           <a:lstStyle/>
           <a:p>
-            <a:pPr algn="ctr"/>
+            <a:r>
+              <a:rPr lang="en-US" altLang="ko-KR" sz="2400" dirty="0">
+                <a:solidFill>
+                  <a:schemeClr val="bg1">
+                    <a:lumMod val="85000"/>
+                  </a:schemeClr>
+                </a:solidFill>
+              </a:rPr>
+              <a:t>System</a:t>
+            </a:r>
             <a:r>
               <a:rPr lang="en-US" altLang="ko-KR" dirty="0" smtClean="0"/>
-              <a:t>Thank you!</a:t>
+              <a:t/>
+            </a:r>
+            <a:br>
+              <a:rPr lang="en-US" altLang="ko-KR" dirty="0" smtClean="0"/>
+            </a:br>
+            <a:r>
+              <a:rPr lang="en-US" altLang="ko-KR" dirty="0" smtClean="0"/>
+              <a:t>2) Map</a:t>
             </a:r>
             <a:endParaRPr lang="ko-KR" altLang="en-US" dirty="0"/>
           </a:p>
@@ -4611,12 +6167,7 @@
             <p:ph idx="1"/>
           </p:nvPr>
         </p:nvSpPr>
-        <p:spPr>
-          <a:xfrm>
-            <a:off x="628650" y="3698789"/>
-            <a:ext cx="7886700" cy="2478174"/>
-          </a:xfrm>
-        </p:spPr>
+        <p:spPr/>
         <p:txBody>
           <a:bodyPr>
             <a:normAutofit/>
@@ -4627,20 +6178,72 @@
               <a:buNone/>
             </a:pPr>
             <a:r>
-              <a:rPr lang="en-US" altLang="ko-KR" sz="4000" dirty="0"/>
-              <a:t>A</a:t>
-            </a:r>
-            <a:r>
-              <a:rPr lang="en-US" altLang="ko-KR" sz="4000" dirty="0" smtClean="0"/>
-              <a:t>nd any questions?</a:t>
-            </a:r>
+              <a:rPr lang="ko-KR" altLang="en-US" dirty="0" smtClean="0"/>
+              <a:t>원형 미로 모양 </a:t>
+            </a:r>
+            <a:r>
+              <a:rPr lang="en-US" altLang="ko-KR" dirty="0" smtClean="0"/>
+              <a:t>Map</a:t>
+            </a:r>
+          </a:p>
+          <a:p>
+            <a:pPr marL="0" indent="0" algn="ctr">
+              <a:buNone/>
+            </a:pPr>
+            <a:r>
+              <a:rPr lang="ko-KR" altLang="en-US" dirty="0" smtClean="0"/>
+              <a:t>시작 지점에 </a:t>
+            </a:r>
+            <a:r>
+              <a:rPr lang="en-US" altLang="ko-KR" dirty="0" smtClean="0"/>
+              <a:t>Mini</a:t>
+            </a:r>
+            <a:r>
+              <a:rPr lang="ko-KR" altLang="en-US" dirty="0" smtClean="0"/>
+              <a:t> </a:t>
+            </a:r>
+            <a:r>
+              <a:rPr lang="en-US" altLang="ko-KR" dirty="0"/>
+              <a:t>Map</a:t>
+            </a:r>
+            <a:r>
+              <a:rPr lang="en-US" altLang="ko-KR" dirty="0" smtClean="0"/>
+              <a:t> </a:t>
+            </a:r>
+            <a:r>
+              <a:rPr lang="ko-KR" altLang="en-US" dirty="0" smtClean="0"/>
+              <a:t>표시</a:t>
+            </a:r>
+            <a:endParaRPr lang="en-US" altLang="ko-KR" dirty="0" smtClean="0"/>
+          </a:p>
+          <a:p>
+            <a:pPr marL="0" indent="0" algn="ctr">
+              <a:buNone/>
+            </a:pPr>
+            <a:r>
+              <a:rPr lang="ko-KR" altLang="en-US" dirty="0" smtClean="0"/>
+              <a:t>특정 </a:t>
+            </a:r>
+            <a:r>
+              <a:rPr lang="ko-KR" altLang="en-US" dirty="0" smtClean="0"/>
+              <a:t>조건 만족 시 전체 </a:t>
+            </a:r>
+            <a:r>
+              <a:rPr lang="en-US" altLang="ko-KR" dirty="0" smtClean="0"/>
+              <a:t>Map</a:t>
+            </a:r>
+            <a:r>
+              <a:rPr lang="ko-KR" altLang="en-US" dirty="0" smtClean="0"/>
+              <a:t>이 넓어짐</a:t>
+            </a:r>
+            <a:endParaRPr lang="en-US" altLang="ko-KR" dirty="0" smtClean="0"/>
           </a:p>
         </p:txBody>
       </p:sp>
     </p:spTree>
     <p:extLst>
       <p:ext uri="{BB962C8B-B14F-4D97-AF65-F5344CB8AC3E}">
-        <p14:creationId xmlns:p14="http://schemas.microsoft.com/office/powerpoint/2010/main" val="882950775"/>
+        <p14:creationId xmlns:p14="http://schemas.microsoft.com/office/powerpoint/2010/main" val="583333442"/>
       </p:ext>
     </p:extLst>
   </p:cSld>
@@ -4691,6 +6294,146 @@
           </a:bodyPr>
           <a:lstStyle/>
           <a:p>
+            <a:r>
+              <a:rPr lang="en-US" altLang="ko-KR" sz="2400" dirty="0">
+                <a:solidFill>
+                  <a:schemeClr val="bg1">
+                    <a:lumMod val="85000"/>
+                  </a:schemeClr>
+                </a:solidFill>
+              </a:rPr>
+              <a:t>System</a:t>
+            </a:r>
+            <a:r>
+              <a:rPr lang="en-US" altLang="ko-KR" dirty="0" smtClean="0"/>
+              <a:t/>
+            </a:r>
+            <a:br>
+              <a:rPr lang="en-US" altLang="ko-KR" dirty="0" smtClean="0"/>
+            </a:br>
+            <a:r>
+              <a:rPr lang="en-US" altLang="ko-KR" dirty="0" smtClean="0"/>
+              <a:t>3) Unlock</a:t>
+            </a:r>
+            <a:endParaRPr lang="ko-KR" altLang="en-US" dirty="0"/>
+          </a:p>
+        </p:txBody>
+      </p:sp>
+      <p:sp>
+        <p:nvSpPr>
+          <p:cNvPr id="3" name="내용 개체 틀 2"/>
+          <p:cNvSpPr>
+            <a:spLocks noGrp="1"/>
+          </p:cNvSpPr>
+          <p:nvPr>
+            <p:ph idx="1"/>
+          </p:nvPr>
+        </p:nvSpPr>
+        <p:spPr/>
+        <p:txBody>
+          <a:bodyPr/>
+          <a:lstStyle/>
+          <a:p>
+            <a:pPr marL="0" indent="0" algn="ctr">
+              <a:buNone/>
+            </a:pPr>
+            <a:r>
+              <a:rPr lang="en-US" altLang="ko-KR" dirty="0" smtClean="0"/>
+              <a:t>Story</a:t>
+            </a:r>
+            <a:r>
+              <a:rPr lang="ko-KR" altLang="en-US" dirty="0" smtClean="0"/>
+              <a:t> </a:t>
+            </a:r>
+            <a:r>
+              <a:rPr lang="en-US" altLang="ko-KR" dirty="0" smtClean="0"/>
+              <a:t>Unlock / Field Unlock</a:t>
+            </a:r>
+          </a:p>
+          <a:p>
+            <a:pPr marL="0" indent="0" algn="ctr">
+              <a:buNone/>
+            </a:pPr>
+            <a:r>
+              <a:rPr lang="ko-KR" altLang="en-US" dirty="0" smtClean="0"/>
+              <a:t>게임 내 생존시간 증가</a:t>
+            </a:r>
+            <a:endParaRPr lang="en-US" altLang="ko-KR" dirty="0" smtClean="0"/>
+          </a:p>
+          <a:p>
+            <a:pPr marL="0" indent="0" algn="ctr">
+              <a:buNone/>
+            </a:pPr>
+            <a:r>
+              <a:rPr lang="ko-KR" altLang="en-US" dirty="0" smtClean="0"/>
+              <a:t>이동 가능한 </a:t>
+            </a:r>
+            <a:r>
+              <a:rPr lang="en-US" altLang="ko-KR" dirty="0" smtClean="0"/>
+              <a:t>Map </a:t>
+            </a:r>
+            <a:r>
+              <a:rPr lang="ko-KR" altLang="en-US" dirty="0" smtClean="0"/>
+              <a:t>범위 확대</a:t>
+            </a:r>
+            <a:endParaRPr lang="en-US" altLang="ko-KR" dirty="0" smtClean="0"/>
+          </a:p>
+        </p:txBody>
+      </p:sp>
+    </p:spTree>
+    <p:extLst>
+      <p:ext uri="{BB962C8B-B14F-4D97-AF65-F5344CB8AC3E}">
+        <p14:creationId xmlns:p14="http://schemas.microsoft.com/office/powerpoint/2010/main" val="1761270093"/>
+      </p:ext>
+    </p:extLst>
+  </p:cSld>
+  <p:clrMapOvr>
+    <a:masterClrMapping/>
+  </p:clrMapOvr>
+  <p:timing>
+    <p:tnLst>
+      <p:par>
+        <p:cTn id="1" dur="indefinite" restart="never" nodeType="tmRoot"/>
+      </p:par>
+    </p:tnLst>
+  </p:timing>
+</p:sld>
+</file>
+
+<file path=ppt/slides/slide9.xml><?xml version="1.0" encoding="utf-8"?>
+<p:sld xmlns:a="http://schemas.openxmlformats.org/drawingml/2006/main" xmlns:r="http://schemas.openxmlformats.org/officeDocument/2006/relationships" xmlns:p="http://schemas.openxmlformats.org/presentationml/2006/main">
+  <p:cSld>
+    <p:spTree>
+      <p:nvGrpSpPr>
+        <p:cNvPr id="1" name=""/>
+        <p:cNvGrpSpPr/>
+        <p:nvPr/>
+      </p:nvGrpSpPr>
+      <p:grpSpPr>
+        <a:xfrm>
+          <a:off x="0" y="0"/>
+          <a:ext cx="0" cy="0"/>
+          <a:chOff x="0" y="0"/>
+          <a:chExt cx="0" cy="0"/>
+        </a:xfrm>
+      </p:grpSpPr>
+      <p:sp>
+        <p:nvSpPr>
+          <p:cNvPr id="2" name="제목 1"/>
+          <p:cNvSpPr>
+            <a:spLocks noGrp="1"/>
+          </p:cNvSpPr>
+          <p:nvPr>
+            <p:ph type="title"/>
+          </p:nvPr>
+        </p:nvSpPr>
+        <p:spPr/>
+        <p:txBody>
+          <a:bodyPr>
+            <a:normAutofit/>
+          </a:bodyPr>
+          <a:lstStyle/>
+          <a:p>
             <a:pPr algn="ctr"/>
             <a:r>
               <a:rPr lang="en-US" altLang="ko-KR" dirty="0" smtClean="0"/>
@@ -4831,7 +6574,7 @@
     </p:spTree>
     <p:extLst>
       <p:ext uri="{BB962C8B-B14F-4D97-AF65-F5344CB8AC3E}">
-        <p14:creationId xmlns:p14="http://schemas.microsoft.com/office/powerpoint/2010/main" val="1427677940"/>
+        <p14:creationId xmlns:p14="http://schemas.microsoft.com/office/powerpoint/2010/main" val="1735475172"/>
       </p:ext>
     </p:extLst>
   </p:cSld>

</xml_diff>